<commit_message>
this is a presentation
</commit_message>
<xml_diff>
--- a/grundpraktikum2/Optik 2/Optik II.pptx
+++ b/grundpraktikum2/Optik 2/Optik II.pptx
@@ -10,11 +10,10 @@
     <p:sldId id="258" r:id="rId4"/>
     <p:sldId id="265" r:id="rId5"/>
     <p:sldId id="259" r:id="rId6"/>
-    <p:sldId id="264" r:id="rId7"/>
-    <p:sldId id="260" r:id="rId8"/>
-    <p:sldId id="261" r:id="rId9"/>
-    <p:sldId id="262" r:id="rId10"/>
-    <p:sldId id="263" r:id="rId11"/>
+    <p:sldId id="260" r:id="rId7"/>
+    <p:sldId id="261" r:id="rId8"/>
+    <p:sldId id="262" r:id="rId9"/>
+    <p:sldId id="263" r:id="rId10"/>
   </p:sldIdLst>
   <p:sldSz cx="12192000" cy="6858000"/>
   <p:notesSz cx="6858000" cy="9144000"/>
@@ -123,7 +122,6 @@
             <p14:sldId id="258"/>
             <p14:sldId id="265"/>
             <p14:sldId id="259"/>
-            <p14:sldId id="264"/>
             <p14:sldId id="260"/>
             <p14:sldId id="261"/>
             <p14:sldId id="262"/>
@@ -290,7 +288,7 @@
           <a:p>
             <a:fld id="{51762B1C-150F-4B00-BBF2-B31DE7314112}" type="datetimeFigureOut">
               <a:rPr lang="de-DE" smtClean="0"/>
-              <a:t>10.09.2017</a:t>
+              <a:t>11.09.2017</a:t>
             </a:fld>
             <a:endParaRPr lang="de-DE"/>
           </a:p>
@@ -488,7 +486,7 @@
           <a:p>
             <a:fld id="{51762B1C-150F-4B00-BBF2-B31DE7314112}" type="datetimeFigureOut">
               <a:rPr lang="de-DE" smtClean="0"/>
-              <a:t>10.09.2017</a:t>
+              <a:t>11.09.2017</a:t>
             </a:fld>
             <a:endParaRPr lang="de-DE"/>
           </a:p>
@@ -696,7 +694,7 @@
           <a:p>
             <a:fld id="{51762B1C-150F-4B00-BBF2-B31DE7314112}" type="datetimeFigureOut">
               <a:rPr lang="de-DE" smtClean="0"/>
-              <a:t>10.09.2017</a:t>
+              <a:t>11.09.2017</a:t>
             </a:fld>
             <a:endParaRPr lang="de-DE"/>
           </a:p>
@@ -894,7 +892,7 @@
           <a:p>
             <a:fld id="{51762B1C-150F-4B00-BBF2-B31DE7314112}" type="datetimeFigureOut">
               <a:rPr lang="de-DE" smtClean="0"/>
-              <a:t>10.09.2017</a:t>
+              <a:t>11.09.2017</a:t>
             </a:fld>
             <a:endParaRPr lang="de-DE"/>
           </a:p>
@@ -1169,7 +1167,7 @@
           <a:p>
             <a:fld id="{51762B1C-150F-4B00-BBF2-B31DE7314112}" type="datetimeFigureOut">
               <a:rPr lang="de-DE" smtClean="0"/>
-              <a:t>10.09.2017</a:t>
+              <a:t>11.09.2017</a:t>
             </a:fld>
             <a:endParaRPr lang="de-DE"/>
           </a:p>
@@ -1434,7 +1432,7 @@
           <a:p>
             <a:fld id="{51762B1C-150F-4B00-BBF2-B31DE7314112}" type="datetimeFigureOut">
               <a:rPr lang="de-DE" smtClean="0"/>
-              <a:t>10.09.2017</a:t>
+              <a:t>11.09.2017</a:t>
             </a:fld>
             <a:endParaRPr lang="de-DE"/>
           </a:p>
@@ -1846,7 +1844,7 @@
           <a:p>
             <a:fld id="{51762B1C-150F-4B00-BBF2-B31DE7314112}" type="datetimeFigureOut">
               <a:rPr lang="de-DE" smtClean="0"/>
-              <a:t>10.09.2017</a:t>
+              <a:t>11.09.2017</a:t>
             </a:fld>
             <a:endParaRPr lang="de-DE"/>
           </a:p>
@@ -1987,7 +1985,7 @@
           <a:p>
             <a:fld id="{51762B1C-150F-4B00-BBF2-B31DE7314112}" type="datetimeFigureOut">
               <a:rPr lang="de-DE" smtClean="0"/>
-              <a:t>10.09.2017</a:t>
+              <a:t>11.09.2017</a:t>
             </a:fld>
             <a:endParaRPr lang="de-DE"/>
           </a:p>
@@ -2100,7 +2098,7 @@
           <a:p>
             <a:fld id="{51762B1C-150F-4B00-BBF2-B31DE7314112}" type="datetimeFigureOut">
               <a:rPr lang="de-DE" smtClean="0"/>
-              <a:t>10.09.2017</a:t>
+              <a:t>11.09.2017</a:t>
             </a:fld>
             <a:endParaRPr lang="de-DE"/>
           </a:p>
@@ -2411,7 +2409,7 @@
           <a:p>
             <a:fld id="{51762B1C-150F-4B00-BBF2-B31DE7314112}" type="datetimeFigureOut">
               <a:rPr lang="de-DE" smtClean="0"/>
-              <a:t>10.09.2017</a:t>
+              <a:t>11.09.2017</a:t>
             </a:fld>
             <a:endParaRPr lang="de-DE"/>
           </a:p>
@@ -2699,7 +2697,7 @@
           <a:p>
             <a:fld id="{51762B1C-150F-4B00-BBF2-B31DE7314112}" type="datetimeFigureOut">
               <a:rPr lang="de-DE" smtClean="0"/>
-              <a:t>10.09.2017</a:t>
+              <a:t>11.09.2017</a:t>
             </a:fld>
             <a:endParaRPr lang="de-DE"/>
           </a:p>
@@ -2940,7 +2938,7 @@
           <a:p>
             <a:fld id="{51762B1C-150F-4B00-BBF2-B31DE7314112}" type="datetimeFigureOut">
               <a:rPr lang="de-DE" smtClean="0"/>
-              <a:t>10.09.2017</a:t>
+              <a:t>11.09.2017</a:t>
             </a:fld>
             <a:endParaRPr lang="de-DE"/>
           </a:p>
@@ -3460,7 +3458,7 @@
 </p:sld>
 </file>
 
-<file path=ppt/slides/slide10.xml><?xml version="1.0" encoding="utf-8"?>
+<file path=ppt/slides/slide2.xml><?xml version="1.0" encoding="utf-8"?>
 <p:sld xmlns:a="http://schemas.openxmlformats.org/drawingml/2006/main" xmlns:r="http://schemas.openxmlformats.org/officeDocument/2006/relationships" xmlns:p="http://schemas.openxmlformats.org/presentationml/2006/main">
   <p:cSld>
     <p:spTree>
@@ -3482,6 +3480,1500 @@
           <p:cNvPr id="2" name="Titel 1">
             <a:extLst>
               <a:ext uri="{FF2B5EF4-FFF2-40B4-BE49-F238E27FC236}">
+                <a16:creationId xmlns:a16="http://schemas.microsoft.com/office/drawing/2014/main" id="{BDEBBD1B-5604-4C3F-B34C-22D02BB3B57A}"/>
+              </a:ext>
+            </a:extLst>
+          </p:cNvPr>
+          <p:cNvSpPr>
+            <a:spLocks noGrp="1"/>
+          </p:cNvSpPr>
+          <p:nvPr>
+            <p:ph type="title"/>
+          </p:nvPr>
+        </p:nvSpPr>
+        <p:spPr/>
+        <p:txBody>
+          <a:bodyPr/>
+          <a:lstStyle/>
+          <a:p>
+            <a:r>
+              <a:rPr lang="de-DE" dirty="0"/>
+              <a:t>Inhalt</a:t>
+            </a:r>
+          </a:p>
+        </p:txBody>
+      </p:sp>
+      <p:sp>
+        <p:nvSpPr>
+          <p:cNvPr id="3" name="Inhaltsplatzhalter 2">
+            <a:extLst>
+              <a:ext uri="{FF2B5EF4-FFF2-40B4-BE49-F238E27FC236}">
+                <a16:creationId xmlns:a16="http://schemas.microsoft.com/office/drawing/2014/main" id="{A86B45DA-DF66-4B65-AE36-ACC26DE96D41}"/>
+              </a:ext>
+            </a:extLst>
+          </p:cNvPr>
+          <p:cNvSpPr>
+            <a:spLocks noGrp="1"/>
+          </p:cNvSpPr>
+          <p:nvPr>
+            <p:ph idx="1"/>
+          </p:nvPr>
+        </p:nvSpPr>
+        <p:spPr/>
+        <p:txBody>
+          <a:bodyPr/>
+          <a:lstStyle/>
+          <a:p>
+            <a:endParaRPr lang="de-DE"/>
+          </a:p>
+        </p:txBody>
+      </p:sp>
+    </p:spTree>
+    <p:extLst>
+      <p:ext uri="{BB962C8B-B14F-4D97-AF65-F5344CB8AC3E}">
+        <p14:creationId xmlns:p14="http://schemas.microsoft.com/office/powerpoint/2010/main" val="1002867433"/>
+      </p:ext>
+    </p:extLst>
+  </p:cSld>
+  <p:clrMapOvr>
+    <a:masterClrMapping/>
+  </p:clrMapOvr>
+</p:sld>
+</file>
+
+<file path=ppt/slides/slide3.xml><?xml version="1.0" encoding="utf-8"?>
+<p:sld xmlns:a="http://schemas.openxmlformats.org/drawingml/2006/main" xmlns:r="http://schemas.openxmlformats.org/officeDocument/2006/relationships" xmlns:p="http://schemas.openxmlformats.org/presentationml/2006/main">
+  <p:cSld>
+    <p:spTree>
+      <p:nvGrpSpPr>
+        <p:cNvPr id="1" name=""/>
+        <p:cNvGrpSpPr/>
+        <p:nvPr/>
+      </p:nvGrpSpPr>
+      <p:grpSpPr>
+        <a:xfrm>
+          <a:off x="0" y="0"/>
+          <a:ext cx="0" cy="0"/>
+          <a:chOff x="0" y="0"/>
+          <a:chExt cx="0" cy="0"/>
+        </a:xfrm>
+      </p:grpSpPr>
+      <p:sp>
+        <p:nvSpPr>
+          <p:cNvPr id="2" name="Titel 1">
+            <a:extLst>
+              <a:ext uri="{FF2B5EF4-FFF2-40B4-BE49-F238E27FC236}">
+                <a16:creationId xmlns:a16="http://schemas.microsoft.com/office/drawing/2014/main" id="{530447DF-7F46-4D7E-89D2-6E3790C152C9}"/>
+              </a:ext>
+            </a:extLst>
+          </p:cNvPr>
+          <p:cNvSpPr>
+            <a:spLocks noGrp="1"/>
+          </p:cNvSpPr>
+          <p:nvPr>
+            <p:ph type="title"/>
+          </p:nvPr>
+        </p:nvSpPr>
+        <p:spPr/>
+        <p:txBody>
+          <a:bodyPr/>
+          <a:lstStyle/>
+          <a:p>
+            <a:r>
+              <a:rPr lang="de-DE" dirty="0"/>
+              <a:t>Versuchsziele</a:t>
+            </a:r>
+          </a:p>
+        </p:txBody>
+      </p:sp>
+      <p:sp>
+        <p:nvSpPr>
+          <p:cNvPr id="3" name="Inhaltsplatzhalter 2">
+            <a:extLst>
+              <a:ext uri="{FF2B5EF4-FFF2-40B4-BE49-F238E27FC236}">
+                <a16:creationId xmlns:a16="http://schemas.microsoft.com/office/drawing/2014/main" id="{B2D5C7AF-FB30-41DD-8A73-75C4E070D1A1}"/>
+              </a:ext>
+            </a:extLst>
+          </p:cNvPr>
+          <p:cNvSpPr>
+            <a:spLocks noGrp="1"/>
+          </p:cNvSpPr>
+          <p:nvPr>
+            <p:ph idx="1"/>
+          </p:nvPr>
+        </p:nvSpPr>
+        <p:spPr/>
+        <p:txBody>
+          <a:bodyPr/>
+          <a:lstStyle/>
+          <a:p>
+            <a:endParaRPr lang="de-DE"/>
+          </a:p>
+        </p:txBody>
+      </p:sp>
+    </p:spTree>
+    <p:extLst>
+      <p:ext uri="{BB962C8B-B14F-4D97-AF65-F5344CB8AC3E}">
+        <p14:creationId xmlns:p14="http://schemas.microsoft.com/office/powerpoint/2010/main" val="339534271"/>
+      </p:ext>
+    </p:extLst>
+  </p:cSld>
+  <p:clrMapOvr>
+    <a:masterClrMapping/>
+  </p:clrMapOvr>
+</p:sld>
+</file>
+
+<file path=ppt/slides/slide4.xml><?xml version="1.0" encoding="utf-8"?>
+<p:sld xmlns:a="http://schemas.openxmlformats.org/drawingml/2006/main" xmlns:r="http://schemas.openxmlformats.org/officeDocument/2006/relationships" xmlns:p="http://schemas.openxmlformats.org/presentationml/2006/main">
+  <p:cSld>
+    <p:spTree>
+      <p:nvGrpSpPr>
+        <p:cNvPr id="1" name=""/>
+        <p:cNvGrpSpPr/>
+        <p:nvPr/>
+      </p:nvGrpSpPr>
+      <p:grpSpPr>
+        <a:xfrm>
+          <a:off x="0" y="0"/>
+          <a:ext cx="0" cy="0"/>
+          <a:chOff x="0" y="0"/>
+          <a:chExt cx="0" cy="0"/>
+        </a:xfrm>
+      </p:grpSpPr>
+      <p:sp>
+        <p:nvSpPr>
+          <p:cNvPr id="2" name="Titel 1">
+            <a:extLst>
+              <a:ext uri="{FF2B5EF4-FFF2-40B4-BE49-F238E27FC236}">
+                <a16:creationId xmlns:a16="http://schemas.microsoft.com/office/drawing/2014/main" id="{B0961A0C-1807-420A-BE95-3F2D0A77A4C9}"/>
+              </a:ext>
+            </a:extLst>
+          </p:cNvPr>
+          <p:cNvSpPr>
+            <a:spLocks noGrp="1"/>
+          </p:cNvSpPr>
+          <p:nvPr>
+            <p:ph type="title"/>
+          </p:nvPr>
+        </p:nvSpPr>
+        <p:spPr/>
+        <p:txBody>
+          <a:bodyPr/>
+          <a:lstStyle/>
+          <a:p>
+            <a:r>
+              <a:rPr lang="de-DE" dirty="0"/>
+              <a:t>Physikalische Grundlagen</a:t>
+            </a:r>
+          </a:p>
+        </p:txBody>
+      </p:sp>
+      <mc:AlternateContent xmlns:mc="http://schemas.openxmlformats.org/markup-compatibility/2006" xmlns:a14="http://schemas.microsoft.com/office/drawing/2010/main">
+        <mc:Choice Requires="a14">
+          <p:sp>
+            <p:nvSpPr>
+              <p:cNvPr id="3" name="Inhaltsplatzhalter 2">
+                <a:extLst>
+                  <a:ext uri="{FF2B5EF4-FFF2-40B4-BE49-F238E27FC236}">
+                    <a16:creationId xmlns:a16="http://schemas.microsoft.com/office/drawing/2014/main" id="{388E1FC6-8805-48F7-82FA-CD1F9F36C2EF}"/>
+                  </a:ext>
+                </a:extLst>
+              </p:cNvPr>
+              <p:cNvSpPr>
+                <a:spLocks noGrp="1"/>
+              </p:cNvSpPr>
+              <p:nvPr>
+                <p:ph idx="1"/>
+              </p:nvPr>
+            </p:nvSpPr>
+            <p:spPr/>
+            <p:txBody>
+              <a:bodyPr/>
+              <a:lstStyle/>
+              <a:p>
+                <a:endParaRPr lang="de-DE" b="0" i="1" dirty="0">
+                  <a:latin typeface="Cambria Math" panose="02040503050406030204" pitchFamily="18" charset="0"/>
+                </a:endParaRPr>
+              </a:p>
+              <a:p>
+                <a14:m>
+                  <m:oMath xmlns:m="http://schemas.openxmlformats.org/officeDocument/2006/math">
+                    <m:r>
+                      <a:rPr lang="de-DE" b="0" i="1" smtClean="0">
+                        <a:latin typeface="Cambria Math" panose="02040503050406030204" pitchFamily="18" charset="0"/>
+                      </a:rPr>
+                      <m:t>2</m:t>
+                    </m:r>
+                    <m:r>
+                      <a:rPr lang="de-DE" b="0" i="1" smtClean="0">
+                        <a:latin typeface="Cambria Math" panose="02040503050406030204" pitchFamily="18" charset="0"/>
+                      </a:rPr>
+                      <m:t>𝑑</m:t>
+                    </m:r>
+                    <m:func>
+                      <m:funcPr>
+                        <m:ctrlPr>
+                          <a:rPr lang="de-DE" b="0" i="1" smtClean="0">
+                            <a:latin typeface="Cambria Math" panose="02040503050406030204" pitchFamily="18" charset="0"/>
+                          </a:rPr>
+                        </m:ctrlPr>
+                      </m:funcPr>
+                      <m:fName>
+                        <m:r>
+                          <m:rPr>
+                            <m:sty m:val="p"/>
+                          </m:rPr>
+                          <a:rPr lang="de-DE" b="0" i="0" smtClean="0">
+                            <a:latin typeface="Cambria Math" panose="02040503050406030204" pitchFamily="18" charset="0"/>
+                          </a:rPr>
+                          <m:t>cos</m:t>
+                        </m:r>
+                      </m:fName>
+                      <m:e>
+                        <m:r>
+                          <a:rPr lang="de-DE" b="0" i="1" smtClean="0">
+                            <a:latin typeface="Cambria Math" panose="02040503050406030204" pitchFamily="18" charset="0"/>
+                          </a:rPr>
+                          <m:t>𝜃</m:t>
+                        </m:r>
+                      </m:e>
+                    </m:func>
+                    <m:r>
+                      <a:rPr lang="de-DE" b="0" i="1" smtClean="0">
+                        <a:latin typeface="Cambria Math" panose="02040503050406030204" pitchFamily="18" charset="0"/>
+                      </a:rPr>
+                      <m:t>=</m:t>
+                    </m:r>
+                    <m:r>
+                      <a:rPr lang="de-DE" b="0" i="1" smtClean="0">
+                        <a:latin typeface="Cambria Math" panose="02040503050406030204" pitchFamily="18" charset="0"/>
+                      </a:rPr>
+                      <m:t>𝑚</m:t>
+                    </m:r>
+                    <m:r>
+                      <a:rPr lang="de-DE" b="0" i="1" smtClean="0">
+                        <a:latin typeface="Cambria Math" panose="02040503050406030204" pitchFamily="18" charset="0"/>
+                      </a:rPr>
+                      <m:t>𝜆</m:t>
+                    </m:r>
+                    <m:r>
+                      <a:rPr lang="de-DE" b="0" i="0" smtClean="0">
+                        <a:latin typeface="Cambria Math" panose="02040503050406030204" pitchFamily="18" charset="0"/>
+                      </a:rPr>
+                      <m:t> ,  </m:t>
+                    </m:r>
+                    <m:r>
+                      <m:rPr>
+                        <m:sty m:val="p"/>
+                      </m:rPr>
+                      <a:rPr lang="de-DE" b="0" i="0" smtClean="0">
+                        <a:latin typeface="Cambria Math" panose="02040503050406030204" pitchFamily="18" charset="0"/>
+                      </a:rPr>
+                      <m:t>m</m:t>
+                    </m:r>
+                    <m:r>
+                      <a:rPr lang="de-DE" b="0" i="0" smtClean="0">
+                        <a:latin typeface="Cambria Math" panose="02040503050406030204" pitchFamily="18" charset="0"/>
+                      </a:rPr>
+                      <m:t>=0, 1, 2, …</m:t>
+                    </m:r>
+                  </m:oMath>
+                </a14:m>
+                <a:endParaRPr lang="de-DE" dirty="0"/>
+              </a:p>
+              <a:p>
+                <a:endParaRPr lang="de-DE" dirty="0"/>
+              </a:p>
+              <a:p>
+                <a14:m>
+                  <m:oMath xmlns:m="http://schemas.openxmlformats.org/officeDocument/2006/math">
+                    <m:r>
+                      <a:rPr lang="de-DE" b="0" i="1" smtClean="0">
+                        <a:latin typeface="Cambria Math" panose="02040503050406030204" pitchFamily="18" charset="0"/>
+                      </a:rPr>
+                      <m:t>𝑛</m:t>
+                    </m:r>
+                    <m:d>
+                      <m:dPr>
+                        <m:ctrlPr>
+                          <a:rPr lang="de-DE" b="0" i="1" smtClean="0">
+                            <a:latin typeface="Cambria Math" panose="02040503050406030204" pitchFamily="18" charset="0"/>
+                          </a:rPr>
+                        </m:ctrlPr>
+                      </m:dPr>
+                      <m:e>
+                        <m:r>
+                          <a:rPr lang="de-DE" b="0" i="1" smtClean="0">
+                            <a:latin typeface="Cambria Math" panose="02040503050406030204" pitchFamily="18" charset="0"/>
+                          </a:rPr>
+                          <m:t>𝑃</m:t>
+                        </m:r>
+                      </m:e>
+                    </m:d>
+                    <m:r>
+                      <a:rPr lang="de-DE" b="0" i="1" smtClean="0">
+                        <a:latin typeface="Cambria Math" panose="02040503050406030204" pitchFamily="18" charset="0"/>
+                      </a:rPr>
+                      <m:t>=1+ </m:t>
+                    </m:r>
+                    <m:f>
+                      <m:fPr>
+                        <m:ctrlPr>
+                          <a:rPr lang="de-DE" b="0" i="1" smtClean="0">
+                            <a:latin typeface="Cambria Math" panose="02040503050406030204" pitchFamily="18" charset="0"/>
+                          </a:rPr>
+                        </m:ctrlPr>
+                      </m:fPr>
+                      <m:num>
+                        <m:r>
+                          <m:rPr>
+                            <m:sty m:val="p"/>
+                          </m:rPr>
+                          <a:rPr lang="de-DE" b="0" i="0" smtClean="0">
+                            <a:latin typeface="Cambria Math" panose="02040503050406030204" pitchFamily="18" charset="0"/>
+                          </a:rPr>
+                          <m:t>Δ</m:t>
+                        </m:r>
+                        <m:r>
+                          <a:rPr lang="de-DE" b="0" i="1" smtClean="0">
+                            <a:latin typeface="Cambria Math" panose="02040503050406030204" pitchFamily="18" charset="0"/>
+                          </a:rPr>
+                          <m:t>𝑛</m:t>
+                        </m:r>
+                      </m:num>
+                      <m:den>
+                        <m:r>
+                          <m:rPr>
+                            <m:sty m:val="p"/>
+                          </m:rPr>
+                          <a:rPr lang="de-DE" b="0" i="0" smtClean="0">
+                            <a:latin typeface="Cambria Math" panose="02040503050406030204" pitchFamily="18" charset="0"/>
+                          </a:rPr>
+                          <m:t>Δ</m:t>
+                        </m:r>
+                        <m:r>
+                          <a:rPr lang="de-DE" b="0" i="1" smtClean="0">
+                            <a:latin typeface="Cambria Math" panose="02040503050406030204" pitchFamily="18" charset="0"/>
+                          </a:rPr>
+                          <m:t>𝑝</m:t>
+                        </m:r>
+                      </m:den>
+                    </m:f>
+                    <m:r>
+                      <a:rPr lang="de-DE" b="0" i="1" smtClean="0">
+                        <a:latin typeface="Cambria Math" panose="02040503050406030204" pitchFamily="18" charset="0"/>
+                      </a:rPr>
+                      <m:t>𝑃</m:t>
+                    </m:r>
+                  </m:oMath>
+                </a14:m>
+                <a:r>
+                  <a:rPr lang="de-DE" dirty="0"/>
+                  <a:t>			</a:t>
+                </a:r>
+                <a14:m>
+                  <m:oMath xmlns:m="http://schemas.openxmlformats.org/officeDocument/2006/math">
+                    <m:f>
+                      <m:fPr>
+                        <m:ctrlPr>
+                          <a:rPr lang="de-DE" i="1" smtClean="0">
+                            <a:latin typeface="Cambria Math" panose="02040503050406030204" pitchFamily="18" charset="0"/>
+                          </a:rPr>
+                        </m:ctrlPr>
+                      </m:fPr>
+                      <m:num>
+                        <m:r>
+                          <m:rPr>
+                            <m:sty m:val="p"/>
+                          </m:rPr>
+                          <a:rPr lang="de-DE" b="0" i="0" smtClean="0">
+                            <a:latin typeface="Cambria Math" panose="02040503050406030204" pitchFamily="18" charset="0"/>
+                          </a:rPr>
+                          <m:t>Δ</m:t>
+                        </m:r>
+                        <m:r>
+                          <a:rPr lang="de-DE" b="0" i="1" smtClean="0">
+                            <a:latin typeface="Cambria Math" panose="02040503050406030204" pitchFamily="18" charset="0"/>
+                          </a:rPr>
+                          <m:t>𝑛</m:t>
+                        </m:r>
+                      </m:num>
+                      <m:den>
+                        <m:r>
+                          <m:rPr>
+                            <m:sty m:val="p"/>
+                          </m:rPr>
+                          <a:rPr lang="de-DE" b="0" i="0" smtClean="0">
+                            <a:latin typeface="Cambria Math" panose="02040503050406030204" pitchFamily="18" charset="0"/>
+                          </a:rPr>
+                          <m:t>Δ</m:t>
+                        </m:r>
+                        <m:r>
+                          <a:rPr lang="de-DE" b="0" i="1" smtClean="0">
+                            <a:latin typeface="Cambria Math" panose="02040503050406030204" pitchFamily="18" charset="0"/>
+                          </a:rPr>
+                          <m:t>𝑝</m:t>
+                        </m:r>
+                      </m:den>
+                    </m:f>
+                    <m:r>
+                      <a:rPr lang="de-DE" b="0" i="1" smtClean="0">
+                        <a:latin typeface="Cambria Math" panose="02040503050406030204" pitchFamily="18" charset="0"/>
+                      </a:rPr>
+                      <m:t>=</m:t>
+                    </m:r>
+                    <m:f>
+                      <m:fPr>
+                        <m:ctrlPr>
+                          <a:rPr lang="de-DE" b="0" i="1" smtClean="0">
+                            <a:latin typeface="Cambria Math" panose="02040503050406030204" pitchFamily="18" charset="0"/>
+                          </a:rPr>
+                        </m:ctrlPr>
+                      </m:fPr>
+                      <m:num>
+                        <m:r>
+                          <m:rPr>
+                            <m:sty m:val="p"/>
+                          </m:rPr>
+                          <a:rPr lang="de-DE" b="0" i="0" smtClean="0">
+                            <a:latin typeface="Cambria Math" panose="02040503050406030204" pitchFamily="18" charset="0"/>
+                          </a:rPr>
+                          <m:t>Δ</m:t>
+                        </m:r>
+                        <m:r>
+                          <a:rPr lang="de-DE" b="0" i="1" smtClean="0">
+                            <a:latin typeface="Cambria Math" panose="02040503050406030204" pitchFamily="18" charset="0"/>
+                          </a:rPr>
+                          <m:t>𝑚</m:t>
+                        </m:r>
+                      </m:num>
+                      <m:den>
+                        <m:r>
+                          <m:rPr>
+                            <m:sty m:val="p"/>
+                          </m:rPr>
+                          <a:rPr lang="de-DE" b="0" i="0" smtClean="0">
+                            <a:latin typeface="Cambria Math" panose="02040503050406030204" pitchFamily="18" charset="0"/>
+                          </a:rPr>
+                          <m:t>Δ</m:t>
+                        </m:r>
+                        <m:r>
+                          <a:rPr lang="de-DE" b="0" i="1" smtClean="0">
+                            <a:latin typeface="Cambria Math" panose="02040503050406030204" pitchFamily="18" charset="0"/>
+                          </a:rPr>
+                          <m:t>𝑝</m:t>
+                        </m:r>
+                      </m:den>
+                    </m:f>
+                    <m:r>
+                      <a:rPr lang="de-DE" b="0" i="1" smtClean="0">
+                        <a:latin typeface="Cambria Math" panose="02040503050406030204" pitchFamily="18" charset="0"/>
+                      </a:rPr>
+                      <m:t> </m:t>
+                    </m:r>
+                    <m:f>
+                      <m:fPr>
+                        <m:ctrlPr>
+                          <a:rPr lang="de-DE" b="0" i="1" smtClean="0">
+                            <a:latin typeface="Cambria Math" panose="02040503050406030204" pitchFamily="18" charset="0"/>
+                          </a:rPr>
+                        </m:ctrlPr>
+                      </m:fPr>
+                      <m:num>
+                        <m:r>
+                          <a:rPr lang="de-DE" b="0" i="1" smtClean="0">
+                            <a:latin typeface="Cambria Math" panose="02040503050406030204" pitchFamily="18" charset="0"/>
+                          </a:rPr>
+                          <m:t>𝜆</m:t>
+                        </m:r>
+                      </m:num>
+                      <m:den>
+                        <m:r>
+                          <a:rPr lang="de-DE" b="0" i="1" smtClean="0">
+                            <a:latin typeface="Cambria Math" panose="02040503050406030204" pitchFamily="18" charset="0"/>
+                          </a:rPr>
+                          <m:t>2</m:t>
+                        </m:r>
+                        <m:r>
+                          <a:rPr lang="de-DE" b="0" i="1" smtClean="0">
+                            <a:latin typeface="Cambria Math" panose="02040503050406030204" pitchFamily="18" charset="0"/>
+                          </a:rPr>
+                          <m:t>𝐿</m:t>
+                        </m:r>
+                      </m:den>
+                    </m:f>
+                  </m:oMath>
+                </a14:m>
+                <a:endParaRPr lang="de-DE" dirty="0"/>
+              </a:p>
+              <a:p>
+                <a:endParaRPr lang="de-DE" dirty="0"/>
+              </a:p>
+              <a:p>
+                <a14:m>
+                  <m:oMath xmlns:m="http://schemas.openxmlformats.org/officeDocument/2006/math">
+                    <m:sSub>
+                      <m:sSubPr>
+                        <m:ctrlPr>
+                          <a:rPr lang="de-DE" b="0" i="1" smtClean="0">
+                            <a:latin typeface="Cambria Math" panose="02040503050406030204" pitchFamily="18" charset="0"/>
+                          </a:rPr>
+                        </m:ctrlPr>
+                      </m:sSubPr>
+                      <m:e>
+                        <m:r>
+                          <a:rPr lang="de-DE" b="0" i="1" smtClean="0">
+                            <a:latin typeface="Cambria Math" panose="02040503050406030204" pitchFamily="18" charset="0"/>
+                          </a:rPr>
+                          <m:t>𝑛</m:t>
+                        </m:r>
+                      </m:e>
+                      <m:sub>
+                        <m:r>
+                          <a:rPr lang="de-DE" b="0" i="1" smtClean="0">
+                            <a:latin typeface="Cambria Math" panose="02040503050406030204" pitchFamily="18" charset="0"/>
+                          </a:rPr>
+                          <m:t>𝐶</m:t>
+                        </m:r>
+                        <m:sSub>
+                          <m:sSubPr>
+                            <m:ctrlPr>
+                              <a:rPr lang="de-DE" b="0" i="1" smtClean="0">
+                                <a:latin typeface="Cambria Math" panose="02040503050406030204" pitchFamily="18" charset="0"/>
+                              </a:rPr>
+                            </m:ctrlPr>
+                          </m:sSubPr>
+                          <m:e>
+                            <m:r>
+                              <a:rPr lang="de-DE" b="0" i="1" smtClean="0">
+                                <a:latin typeface="Cambria Math" panose="02040503050406030204" pitchFamily="18" charset="0"/>
+                              </a:rPr>
+                              <m:t>𝑂</m:t>
+                            </m:r>
+                          </m:e>
+                          <m:sub>
+                            <m:r>
+                              <a:rPr lang="de-DE" b="0" i="1" smtClean="0">
+                                <a:latin typeface="Cambria Math" panose="02040503050406030204" pitchFamily="18" charset="0"/>
+                              </a:rPr>
+                              <m:t>2</m:t>
+                            </m:r>
+                          </m:sub>
+                        </m:sSub>
+                      </m:sub>
+                    </m:sSub>
+                    <m:r>
+                      <a:rPr lang="de-DE" b="0" i="1" smtClean="0">
+                        <a:latin typeface="Cambria Math" panose="02040503050406030204" pitchFamily="18" charset="0"/>
+                      </a:rPr>
+                      <m:t>=</m:t>
+                    </m:r>
+                    <m:sSub>
+                      <m:sSubPr>
+                        <m:ctrlPr>
+                          <a:rPr lang="de-DE" b="0" i="1" smtClean="0">
+                            <a:latin typeface="Cambria Math" panose="02040503050406030204" pitchFamily="18" charset="0"/>
+                          </a:rPr>
+                        </m:ctrlPr>
+                      </m:sSubPr>
+                      <m:e>
+                        <m:r>
+                          <a:rPr lang="de-DE" b="0" i="1" smtClean="0">
+                            <a:latin typeface="Cambria Math" panose="02040503050406030204" pitchFamily="18" charset="0"/>
+                          </a:rPr>
+                          <m:t>𝑛</m:t>
+                        </m:r>
+                      </m:e>
+                      <m:sub>
+                        <m:r>
+                          <a:rPr lang="de-DE" b="0" i="1" smtClean="0">
+                            <a:latin typeface="Cambria Math" panose="02040503050406030204" pitchFamily="18" charset="0"/>
+                          </a:rPr>
+                          <m:t>𝐿𝑢𝑓𝑡</m:t>
+                        </m:r>
+                      </m:sub>
+                    </m:sSub>
+                    <m:r>
+                      <a:rPr lang="de-DE" b="0" i="1" smtClean="0">
+                        <a:latin typeface="Cambria Math" panose="02040503050406030204" pitchFamily="18" charset="0"/>
+                      </a:rPr>
+                      <m:t>+</m:t>
+                    </m:r>
+                    <m:r>
+                      <m:rPr>
+                        <m:sty m:val="p"/>
+                      </m:rPr>
+                      <a:rPr lang="de-DE" b="0" i="0" smtClean="0">
+                        <a:latin typeface="Cambria Math" panose="02040503050406030204" pitchFamily="18" charset="0"/>
+                      </a:rPr>
+                      <m:t>Δ</m:t>
+                    </m:r>
+                    <m:r>
+                      <a:rPr lang="de-DE" b="0" i="1" smtClean="0">
+                        <a:latin typeface="Cambria Math" panose="02040503050406030204" pitchFamily="18" charset="0"/>
+                      </a:rPr>
+                      <m:t>𝑛</m:t>
+                    </m:r>
+                  </m:oMath>
+                </a14:m>
+                <a:r>
+                  <a:rPr lang="de-DE" dirty="0"/>
+                  <a:t>			</a:t>
+                </a:r>
+                <a14:m>
+                  <m:oMath xmlns:m="http://schemas.openxmlformats.org/officeDocument/2006/math">
+                    <m:r>
+                      <m:rPr>
+                        <m:sty m:val="p"/>
+                      </m:rPr>
+                      <a:rPr lang="de-DE" b="0" i="0" smtClean="0">
+                        <a:latin typeface="Cambria Math" panose="02040503050406030204" pitchFamily="18" charset="0"/>
+                      </a:rPr>
+                      <m:t>Δ</m:t>
+                    </m:r>
+                    <m:r>
+                      <a:rPr lang="de-DE" b="0" i="1" smtClean="0">
+                        <a:latin typeface="Cambria Math" panose="02040503050406030204" pitchFamily="18" charset="0"/>
+                      </a:rPr>
+                      <m:t>𝑛</m:t>
+                    </m:r>
+                    <m:r>
+                      <a:rPr lang="de-DE" b="0" i="1" smtClean="0">
+                        <a:latin typeface="Cambria Math" panose="02040503050406030204" pitchFamily="18" charset="0"/>
+                      </a:rPr>
+                      <m:t>=</m:t>
+                    </m:r>
+                    <m:r>
+                      <m:rPr>
+                        <m:sty m:val="p"/>
+                      </m:rPr>
+                      <a:rPr lang="de-DE" b="0" i="0" smtClean="0">
+                        <a:latin typeface="Cambria Math" panose="02040503050406030204" pitchFamily="18" charset="0"/>
+                      </a:rPr>
+                      <m:t>Δ</m:t>
+                    </m:r>
+                    <m:r>
+                      <a:rPr lang="de-DE" b="0" i="1" smtClean="0">
+                        <a:latin typeface="Cambria Math" panose="02040503050406030204" pitchFamily="18" charset="0"/>
+                      </a:rPr>
+                      <m:t>𝑚</m:t>
+                    </m:r>
+                    <m:r>
+                      <a:rPr lang="de-DE" b="0" i="1" smtClean="0">
+                        <a:latin typeface="Cambria Math" panose="02040503050406030204" pitchFamily="18" charset="0"/>
+                      </a:rPr>
+                      <m:t> </m:t>
+                    </m:r>
+                    <m:f>
+                      <m:fPr>
+                        <m:ctrlPr>
+                          <a:rPr lang="de-DE" b="0" i="1" smtClean="0">
+                            <a:latin typeface="Cambria Math" panose="02040503050406030204" pitchFamily="18" charset="0"/>
+                          </a:rPr>
+                        </m:ctrlPr>
+                      </m:fPr>
+                      <m:num>
+                        <m:r>
+                          <a:rPr lang="de-DE" b="0" i="1" smtClean="0">
+                            <a:latin typeface="Cambria Math" panose="02040503050406030204" pitchFamily="18" charset="0"/>
+                          </a:rPr>
+                          <m:t>𝜆</m:t>
+                        </m:r>
+                      </m:num>
+                      <m:den>
+                        <m:r>
+                          <a:rPr lang="de-DE" b="0" i="1" smtClean="0">
+                            <a:latin typeface="Cambria Math" panose="02040503050406030204" pitchFamily="18" charset="0"/>
+                          </a:rPr>
+                          <m:t>2</m:t>
+                        </m:r>
+                        <m:r>
+                          <a:rPr lang="de-DE" b="0" i="1" smtClean="0">
+                            <a:latin typeface="Cambria Math" panose="02040503050406030204" pitchFamily="18" charset="0"/>
+                          </a:rPr>
+                          <m:t>𝐿</m:t>
+                        </m:r>
+                      </m:den>
+                    </m:f>
+                  </m:oMath>
+                </a14:m>
+                <a:endParaRPr lang="de-DE" dirty="0"/>
+              </a:p>
+            </p:txBody>
+          </p:sp>
+        </mc:Choice>
+        <mc:Fallback xmlns="">
+          <p:sp>
+            <p:nvSpPr>
+              <p:cNvPr id="3" name="Inhaltsplatzhalter 2">
+                <a:extLst>
+                  <a:ext uri="{FF2B5EF4-FFF2-40B4-BE49-F238E27FC236}">
+                    <a16:creationId xmlns:a16="http://schemas.microsoft.com/office/drawing/2014/main" id="{388E1FC6-8805-48F7-82FA-CD1F9F36C2EF}"/>
+                  </a:ext>
+                </a:extLst>
+              </p:cNvPr>
+              <p:cNvSpPr>
+                <a:spLocks noGrp="1" noRot="1" noChangeAspect="1" noMove="1" noResize="1" noEditPoints="1" noAdjustHandles="1" noChangeArrowheads="1" noChangeShapeType="1" noTextEdit="1"/>
+              </p:cNvSpPr>
+              <p:nvPr>
+                <p:ph idx="1"/>
+              </p:nvPr>
+            </p:nvSpPr>
+            <p:spPr>
+              <a:blipFill>
+                <a:blip r:embed="rId2"/>
+                <a:stretch>
+                  <a:fillRect/>
+                </a:stretch>
+              </a:blipFill>
+            </p:spPr>
+            <p:txBody>
+              <a:bodyPr/>
+              <a:lstStyle/>
+              <a:p>
+                <a:r>
+                  <a:rPr lang="de-DE">
+                    <a:noFill/>
+                  </a:rPr>
+                  <a:t> </a:t>
+                </a:r>
+              </a:p>
+            </p:txBody>
+          </p:sp>
+        </mc:Fallback>
+      </mc:AlternateContent>
+    </p:spTree>
+    <p:extLst>
+      <p:ext uri="{BB962C8B-B14F-4D97-AF65-F5344CB8AC3E}">
+        <p14:creationId xmlns:p14="http://schemas.microsoft.com/office/powerpoint/2010/main" val="572028677"/>
+      </p:ext>
+    </p:extLst>
+  </p:cSld>
+  <p:clrMapOvr>
+    <a:masterClrMapping/>
+  </p:clrMapOvr>
+</p:sld>
+</file>
+
+<file path=ppt/slides/slide5.xml><?xml version="1.0" encoding="utf-8"?>
+<p:sld xmlns:a="http://schemas.openxmlformats.org/drawingml/2006/main" xmlns:r="http://schemas.openxmlformats.org/officeDocument/2006/relationships" xmlns:p="http://schemas.openxmlformats.org/presentationml/2006/main">
+  <p:cSld>
+    <p:spTree>
+      <p:nvGrpSpPr>
+        <p:cNvPr id="1" name=""/>
+        <p:cNvGrpSpPr/>
+        <p:nvPr/>
+      </p:nvGrpSpPr>
+      <p:grpSpPr>
+        <a:xfrm>
+          <a:off x="0" y="0"/>
+          <a:ext cx="0" cy="0"/>
+          <a:chOff x="0" y="0"/>
+          <a:chExt cx="0" cy="0"/>
+        </a:xfrm>
+      </p:grpSpPr>
+      <p:sp>
+        <p:nvSpPr>
+          <p:cNvPr id="2" name="Titel 1">
+            <a:extLst>
+              <a:ext uri="{FF2B5EF4-FFF2-40B4-BE49-F238E27FC236}">
+                <a16:creationId xmlns:a16="http://schemas.microsoft.com/office/drawing/2014/main" id="{F8AAC1A0-AA0D-4F91-BA12-D360689F2F29}"/>
+              </a:ext>
+            </a:extLst>
+          </p:cNvPr>
+          <p:cNvSpPr>
+            <a:spLocks noGrp="1"/>
+          </p:cNvSpPr>
+          <p:nvPr>
+            <p:ph type="title"/>
+          </p:nvPr>
+        </p:nvSpPr>
+        <p:spPr/>
+        <p:txBody>
+          <a:bodyPr/>
+          <a:lstStyle/>
+          <a:p>
+            <a:r>
+              <a:rPr lang="de-DE" dirty="0"/>
+              <a:t>Aufbau</a:t>
+            </a:r>
+          </a:p>
+        </p:txBody>
+      </p:sp>
+      <p:pic>
+        <p:nvPicPr>
+          <p:cNvPr id="7" name="Inhaltsplatzhalter 6">
+            <a:extLst>
+              <a:ext uri="{FF2B5EF4-FFF2-40B4-BE49-F238E27FC236}">
+                <a16:creationId xmlns:a16="http://schemas.microsoft.com/office/drawing/2014/main" id="{053B5FB9-B407-4DCB-B5A8-3446068287D6}"/>
+              </a:ext>
+            </a:extLst>
+          </p:cNvPr>
+          <p:cNvPicPr>
+            <a:picLocks noGrp="1" noChangeAspect="1"/>
+          </p:cNvPicPr>
+          <p:nvPr>
+            <p:ph sz="half" idx="1"/>
+          </p:nvPr>
+        </p:nvPicPr>
+        <p:blipFill>
+          <a:blip r:embed="rId2">
+            <a:extLst>
+              <a:ext uri="{28A0092B-C50C-407E-A947-70E740481C1C}">
+                <a14:useLocalDpi xmlns:a14="http://schemas.microsoft.com/office/drawing/2010/main" val="0"/>
+              </a:ext>
+            </a:extLst>
+          </a:blip>
+          <a:stretch>
+            <a:fillRect/>
+          </a:stretch>
+        </p:blipFill>
+        <p:spPr>
+          <a:xfrm>
+            <a:off x="2546252" y="597086"/>
+            <a:ext cx="7399899" cy="5713942"/>
+          </a:xfrm>
+        </p:spPr>
+      </p:pic>
+    </p:spTree>
+    <p:extLst>
+      <p:ext uri="{BB962C8B-B14F-4D97-AF65-F5344CB8AC3E}">
+        <p14:creationId xmlns:p14="http://schemas.microsoft.com/office/powerpoint/2010/main" val="794588133"/>
+      </p:ext>
+    </p:extLst>
+  </p:cSld>
+  <p:clrMapOvr>
+    <a:masterClrMapping/>
+  </p:clrMapOvr>
+</p:sld>
+</file>
+
+<file path=ppt/slides/slide6.xml><?xml version="1.0" encoding="utf-8"?>
+<p:sld xmlns:a="http://schemas.openxmlformats.org/drawingml/2006/main" xmlns:r="http://schemas.openxmlformats.org/officeDocument/2006/relationships" xmlns:p="http://schemas.openxmlformats.org/presentationml/2006/main">
+  <p:cSld>
+    <p:spTree>
+      <p:nvGrpSpPr>
+        <p:cNvPr id="1" name=""/>
+        <p:cNvGrpSpPr/>
+        <p:nvPr/>
+      </p:nvGrpSpPr>
+      <p:grpSpPr>
+        <a:xfrm>
+          <a:off x="0" y="0"/>
+          <a:ext cx="0" cy="0"/>
+          <a:chOff x="0" y="0"/>
+          <a:chExt cx="0" cy="0"/>
+        </a:xfrm>
+      </p:grpSpPr>
+      <p:sp>
+        <p:nvSpPr>
+          <p:cNvPr id="2" name="Titel 1">
+            <a:extLst>
+              <a:ext uri="{FF2B5EF4-FFF2-40B4-BE49-F238E27FC236}">
+                <a16:creationId xmlns:a16="http://schemas.microsoft.com/office/drawing/2014/main" id="{82B91491-7839-47EE-BA59-291DA3587ADB}"/>
+              </a:ext>
+            </a:extLst>
+          </p:cNvPr>
+          <p:cNvSpPr>
+            <a:spLocks noGrp="1"/>
+          </p:cNvSpPr>
+          <p:nvPr>
+            <p:ph type="title"/>
+          </p:nvPr>
+        </p:nvSpPr>
+        <p:spPr/>
+        <p:txBody>
+          <a:bodyPr/>
+          <a:lstStyle/>
+          <a:p>
+            <a:r>
+              <a:rPr lang="de-DE" dirty="0"/>
+              <a:t>Kalibration</a:t>
+            </a:r>
+          </a:p>
+        </p:txBody>
+      </p:sp>
+      <mc:AlternateContent xmlns:mc="http://schemas.openxmlformats.org/markup-compatibility/2006">
+        <mc:Choice xmlns:a14="http://schemas.microsoft.com/office/drawing/2010/main" Requires="a14">
+          <p:sp>
+            <p:nvSpPr>
+              <p:cNvPr id="4" name="Inhaltsplatzhalter 3">
+                <a:extLst>
+                  <a:ext uri="{FF2B5EF4-FFF2-40B4-BE49-F238E27FC236}">
+                    <a16:creationId xmlns:a16="http://schemas.microsoft.com/office/drawing/2014/main" id="{D96DEBC0-6F0D-446D-AB92-3E2E0C326FE4}"/>
+                  </a:ext>
+                </a:extLst>
+              </p:cNvPr>
+              <p:cNvSpPr>
+                <a:spLocks noGrp="1"/>
+              </p:cNvSpPr>
+              <p:nvPr>
+                <p:ph sz="half" idx="1"/>
+              </p:nvPr>
+            </p:nvSpPr>
+            <p:spPr/>
+            <p:txBody>
+              <a:bodyPr/>
+              <a:lstStyle/>
+              <a:p>
+                <a:endParaRPr lang="de-DE" b="0" i="1">
+                  <a:latin typeface="Cambria Math" panose="02040503050406030204" pitchFamily="18" charset="0"/>
+                </a:endParaRPr>
+              </a:p>
+              <a:p>
+                <a14:m>
+                  <m:oMath xmlns:m="http://schemas.openxmlformats.org/officeDocument/2006/math">
+                    <m:sSub>
+                      <m:sSubPr>
+                        <m:ctrlPr>
+                          <a:rPr lang="de-DE" b="0" i="1" smtClean="0">
+                            <a:latin typeface="Cambria Math" panose="02040503050406030204" pitchFamily="18" charset="0"/>
+                          </a:rPr>
+                        </m:ctrlPr>
+                      </m:sSubPr>
+                      <m:e>
+                        <m:r>
+                          <a:rPr lang="de-DE" b="0" i="1" smtClean="0">
+                            <a:latin typeface="Cambria Math" panose="02040503050406030204" pitchFamily="18" charset="0"/>
+                          </a:rPr>
+                          <m:t>𝑘</m:t>
+                        </m:r>
+                      </m:e>
+                      <m:sub>
+                        <m:r>
+                          <a:rPr lang="de-DE" b="0" i="1" smtClean="0">
+                            <a:latin typeface="Cambria Math" panose="02040503050406030204" pitchFamily="18" charset="0"/>
+                          </a:rPr>
+                          <m:t>𝐴</m:t>
+                        </m:r>
+                      </m:sub>
+                    </m:sSub>
+                    <m:r>
+                      <a:rPr lang="de-DE" b="0" i="1" smtClean="0">
+                        <a:latin typeface="Cambria Math" panose="02040503050406030204" pitchFamily="18" charset="0"/>
+                      </a:rPr>
+                      <m:t>=0,0487±0,0002</m:t>
+                    </m:r>
+                  </m:oMath>
+                </a14:m>
+                <a:endParaRPr lang="de-DE" dirty="0"/>
+              </a:p>
+              <a:p>
+                <a:endParaRPr lang="de-DE" dirty="0"/>
+              </a:p>
+              <a:p>
+                <a14:m>
+                  <m:oMath xmlns:m="http://schemas.openxmlformats.org/officeDocument/2006/math">
+                    <m:sSub>
+                      <m:sSubPr>
+                        <m:ctrlPr>
+                          <a:rPr lang="de-DE" b="0" i="1" smtClean="0">
+                            <a:latin typeface="Cambria Math" panose="02040503050406030204" pitchFamily="18" charset="0"/>
+                          </a:rPr>
+                        </m:ctrlPr>
+                      </m:sSubPr>
+                      <m:e>
+                        <m:r>
+                          <a:rPr lang="de-DE" b="0" i="1" smtClean="0">
+                            <a:latin typeface="Cambria Math" panose="02040503050406030204" pitchFamily="18" charset="0"/>
+                          </a:rPr>
+                          <m:t>𝑘</m:t>
+                        </m:r>
+                      </m:e>
+                      <m:sub>
+                        <m:r>
+                          <a:rPr lang="de-DE" b="0" i="1" smtClean="0">
+                            <a:latin typeface="Cambria Math" panose="02040503050406030204" pitchFamily="18" charset="0"/>
+                          </a:rPr>
+                          <m:t>𝐵</m:t>
+                        </m:r>
+                      </m:sub>
+                    </m:sSub>
+                    <m:r>
+                      <a:rPr lang="de-DE" b="0" i="1" smtClean="0">
+                        <a:latin typeface="Cambria Math" panose="02040503050406030204" pitchFamily="18" charset="0"/>
+                      </a:rPr>
+                      <m:t>=0.0442±0,0002</m:t>
+                    </m:r>
+                  </m:oMath>
+                </a14:m>
+                <a:endParaRPr lang="de-DE" dirty="0"/>
+              </a:p>
+            </p:txBody>
+          </p:sp>
+        </mc:Choice>
+        <mc:Fallback>
+          <p:sp>
+            <p:nvSpPr>
+              <p:cNvPr id="4" name="Inhaltsplatzhalter 3">
+                <a:extLst>
+                  <a:ext uri="{FF2B5EF4-FFF2-40B4-BE49-F238E27FC236}">
+                    <a16:creationId xmlns:a16="http://schemas.microsoft.com/office/drawing/2014/main" id="{D96DEBC0-6F0D-446D-AB92-3E2E0C326FE4}"/>
+                  </a:ext>
+                </a:extLst>
+              </p:cNvPr>
+              <p:cNvSpPr>
+                <a:spLocks noGrp="1" noRot="1" noChangeAspect="1" noMove="1" noResize="1" noEditPoints="1" noAdjustHandles="1" noChangeArrowheads="1" noChangeShapeType="1" noTextEdit="1"/>
+              </p:cNvSpPr>
+              <p:nvPr>
+                <p:ph sz="half" idx="1"/>
+              </p:nvPr>
+            </p:nvSpPr>
+            <p:spPr>
+              <a:blipFill>
+                <a:blip r:embed="rId2"/>
+                <a:stretch>
+                  <a:fillRect/>
+                </a:stretch>
+              </a:blipFill>
+            </p:spPr>
+            <p:txBody>
+              <a:bodyPr/>
+              <a:lstStyle/>
+              <a:p>
+                <a:r>
+                  <a:rPr lang="de-DE">
+                    <a:noFill/>
+                  </a:rPr>
+                  <a:t> </a:t>
+                </a:r>
+              </a:p>
+            </p:txBody>
+          </p:sp>
+        </mc:Fallback>
+      </mc:AlternateContent>
+      <p:pic>
+        <p:nvPicPr>
+          <p:cNvPr id="10" name="Inhaltsplatzhalter 9">
+            <a:extLst>
+              <a:ext uri="{FF2B5EF4-FFF2-40B4-BE49-F238E27FC236}">
+                <a16:creationId xmlns:a16="http://schemas.microsoft.com/office/drawing/2014/main" id="{DF1CD1B0-BE0D-4BFB-BC93-B6AF0F8C9C8D}"/>
+              </a:ext>
+            </a:extLst>
+          </p:cNvPr>
+          <p:cNvPicPr>
+            <a:picLocks noGrp="1" noChangeAspect="1"/>
+          </p:cNvPicPr>
+          <p:nvPr>
+            <p:ph sz="half" idx="2"/>
+          </p:nvPr>
+        </p:nvPicPr>
+        <p:blipFill>
+          <a:blip r:embed="rId3">
+            <a:extLst>
+              <a:ext uri="{28A0092B-C50C-407E-A947-70E740481C1C}">
+                <a14:useLocalDpi xmlns:a14="http://schemas.microsoft.com/office/drawing/2010/main" val="0"/>
+              </a:ext>
+            </a:extLst>
+          </a:blip>
+          <a:stretch>
+            <a:fillRect/>
+          </a:stretch>
+        </p:blipFill>
+        <p:spPr>
+          <a:xfrm>
+            <a:off x="6172200" y="2215635"/>
+            <a:ext cx="5181600" cy="3571317"/>
+          </a:xfrm>
+        </p:spPr>
+      </p:pic>
+    </p:spTree>
+    <p:extLst>
+      <p:ext uri="{BB962C8B-B14F-4D97-AF65-F5344CB8AC3E}">
+        <p14:creationId xmlns:p14="http://schemas.microsoft.com/office/powerpoint/2010/main" val="957132963"/>
+      </p:ext>
+    </p:extLst>
+  </p:cSld>
+  <p:clrMapOvr>
+    <a:masterClrMapping/>
+  </p:clrMapOvr>
+</p:sld>
+</file>
+
+<file path=ppt/slides/slide7.xml><?xml version="1.0" encoding="utf-8"?>
+<p:sld xmlns:a="http://schemas.openxmlformats.org/drawingml/2006/main" xmlns:r="http://schemas.openxmlformats.org/officeDocument/2006/relationships" xmlns:p="http://schemas.openxmlformats.org/presentationml/2006/main">
+  <p:cSld>
+    <p:spTree>
+      <p:nvGrpSpPr>
+        <p:cNvPr id="1" name=""/>
+        <p:cNvGrpSpPr/>
+        <p:nvPr/>
+      </p:nvGrpSpPr>
+      <p:grpSpPr>
+        <a:xfrm>
+          <a:off x="0" y="0"/>
+          <a:ext cx="0" cy="0"/>
+          <a:chOff x="0" y="0"/>
+          <a:chExt cx="0" cy="0"/>
+        </a:xfrm>
+      </p:grpSpPr>
+      <p:sp>
+        <p:nvSpPr>
+          <p:cNvPr id="2" name="Titel 1">
+            <a:extLst>
+              <a:ext uri="{FF2B5EF4-FFF2-40B4-BE49-F238E27FC236}">
+                <a16:creationId xmlns:a16="http://schemas.microsoft.com/office/drawing/2014/main" id="{1DBBC000-D048-464C-9625-9FDE30AE4F5B}"/>
+              </a:ext>
+            </a:extLst>
+          </p:cNvPr>
+          <p:cNvSpPr>
+            <a:spLocks noGrp="1"/>
+          </p:cNvSpPr>
+          <p:nvPr>
+            <p:ph type="title"/>
+          </p:nvPr>
+        </p:nvSpPr>
+        <p:spPr/>
+        <p:txBody>
+          <a:bodyPr/>
+          <a:lstStyle/>
+          <a:p>
+            <a:r>
+              <a:rPr lang="de-DE" dirty="0"/>
+              <a:t>Wellenlänge</a:t>
+            </a:r>
+          </a:p>
+        </p:txBody>
+      </p:sp>
+      <mc:AlternateContent xmlns:mc="http://schemas.openxmlformats.org/markup-compatibility/2006">
+        <mc:Choice xmlns:a14="http://schemas.microsoft.com/office/drawing/2010/main" Requires="a14">
+          <p:sp>
+            <p:nvSpPr>
+              <p:cNvPr id="4" name="Inhaltsplatzhalter 3">
+                <a:extLst>
+                  <a:ext uri="{FF2B5EF4-FFF2-40B4-BE49-F238E27FC236}">
+                    <a16:creationId xmlns:a16="http://schemas.microsoft.com/office/drawing/2014/main" id="{21317AA6-7E75-483E-A8C6-6B42E89EBC56}"/>
+                  </a:ext>
+                </a:extLst>
+              </p:cNvPr>
+              <p:cNvSpPr>
+                <a:spLocks noGrp="1"/>
+              </p:cNvSpPr>
+              <p:nvPr>
+                <p:ph sz="half" idx="1"/>
+              </p:nvPr>
+            </p:nvSpPr>
+            <p:spPr/>
+            <p:txBody>
+              <a:bodyPr/>
+              <a:lstStyle/>
+              <a:p>
+                <a14:m>
+                  <m:oMath xmlns:m="http://schemas.openxmlformats.org/officeDocument/2006/math">
+                    <m:sSub>
+                      <m:sSubPr>
+                        <m:ctrlPr>
+                          <a:rPr lang="de-DE" b="0" i="1" smtClean="0">
+                            <a:latin typeface="Cambria Math" panose="02040503050406030204" pitchFamily="18" charset="0"/>
+                          </a:rPr>
+                        </m:ctrlPr>
+                      </m:sSubPr>
+                      <m:e>
+                        <m:r>
+                          <a:rPr lang="de-DE" b="0" i="1" smtClean="0">
+                            <a:latin typeface="Cambria Math" panose="02040503050406030204" pitchFamily="18" charset="0"/>
+                          </a:rPr>
+                          <m:t>𝜆</m:t>
+                        </m:r>
+                      </m:e>
+                      <m:sub>
+                        <m:r>
+                          <a:rPr lang="de-DE" b="0" i="1" smtClean="0">
+                            <a:latin typeface="Cambria Math" panose="02040503050406030204" pitchFamily="18" charset="0"/>
+                          </a:rPr>
+                          <m:t>𝐴</m:t>
+                        </m:r>
+                      </m:sub>
+                    </m:sSub>
+                    <m:r>
+                      <a:rPr lang="de-DE" b="0" i="1" smtClean="0">
+                        <a:latin typeface="Cambria Math" panose="02040503050406030204" pitchFamily="18" charset="0"/>
+                      </a:rPr>
+                      <m:t>=(522,6±2,0±2,1)</m:t>
+                    </m:r>
+                  </m:oMath>
+                </a14:m>
+                <a:r>
+                  <a:rPr lang="de-DE" dirty="0"/>
+                  <a:t>nm</a:t>
+                </a:r>
+              </a:p>
+              <a:p>
+                <a:endParaRPr lang="de-DE" dirty="0"/>
+              </a:p>
+              <a:p>
+                <a14:m>
+                  <m:oMath xmlns:m="http://schemas.openxmlformats.org/officeDocument/2006/math">
+                    <m:sSub>
+                      <m:sSubPr>
+                        <m:ctrlPr>
+                          <a:rPr lang="de-DE" b="0" i="1" smtClean="0">
+                            <a:latin typeface="Cambria Math" panose="02040503050406030204" pitchFamily="18" charset="0"/>
+                          </a:rPr>
+                        </m:ctrlPr>
+                      </m:sSubPr>
+                      <m:e>
+                        <m:r>
+                          <a:rPr lang="de-DE" b="0" i="1" smtClean="0">
+                            <a:latin typeface="Cambria Math" panose="02040503050406030204" pitchFamily="18" charset="0"/>
+                          </a:rPr>
+                          <m:t>𝜆</m:t>
+                        </m:r>
+                      </m:e>
+                      <m:sub>
+                        <m:r>
+                          <a:rPr lang="de-DE" b="0" i="1" smtClean="0">
+                            <a:latin typeface="Cambria Math" panose="02040503050406030204" pitchFamily="18" charset="0"/>
+                          </a:rPr>
+                          <m:t>𝐵</m:t>
+                        </m:r>
+                      </m:sub>
+                    </m:sSub>
+                    <m:r>
+                      <a:rPr lang="de-DE" b="0" i="0" smtClean="0">
+                        <a:latin typeface="Cambria Math" panose="02040503050406030204" pitchFamily="18" charset="0"/>
+                      </a:rPr>
+                      <m:t>=(526,1</m:t>
+                    </m:r>
+                    <m:r>
+                      <a:rPr lang="de-DE" b="0" i="1" smtClean="0">
+                        <a:latin typeface="Cambria Math" panose="02040503050406030204" pitchFamily="18" charset="0"/>
+                      </a:rPr>
+                      <m:t>±1,7±2,0)</m:t>
+                    </m:r>
+                  </m:oMath>
+                </a14:m>
+                <a:r>
+                  <a:rPr lang="de-DE" dirty="0"/>
+                  <a:t>nm</a:t>
+                </a:r>
+              </a:p>
+              <a:p>
+                <a:endParaRPr lang="de-DE" dirty="0"/>
+              </a:p>
+              <a:p>
+                <a:r>
+                  <a:rPr lang="de-DE" dirty="0"/>
+                  <a:t>Nominal: </a:t>
+                </a:r>
+                <a14:m>
+                  <m:oMath xmlns:m="http://schemas.openxmlformats.org/officeDocument/2006/math">
+                    <m:r>
+                      <a:rPr lang="de-DE" b="0" i="1" smtClean="0">
+                        <a:latin typeface="Cambria Math" panose="02040503050406030204" pitchFamily="18" charset="0"/>
+                      </a:rPr>
+                      <m:t>𝜆</m:t>
+                    </m:r>
+                    <m:r>
+                      <a:rPr lang="de-DE" b="0" i="1" smtClean="0">
+                        <a:latin typeface="Cambria Math" panose="02040503050406030204" pitchFamily="18" charset="0"/>
+                      </a:rPr>
+                      <m:t>=532</m:t>
+                    </m:r>
+                  </m:oMath>
+                </a14:m>
+                <a:r>
+                  <a:rPr lang="de-DE" dirty="0"/>
+                  <a:t>nm</a:t>
+                </a:r>
+              </a:p>
+            </p:txBody>
+          </p:sp>
+        </mc:Choice>
+        <mc:Fallback>
+          <p:sp>
+            <p:nvSpPr>
+              <p:cNvPr id="4" name="Inhaltsplatzhalter 3">
+                <a:extLst>
+                  <a:ext uri="{FF2B5EF4-FFF2-40B4-BE49-F238E27FC236}">
+                    <a16:creationId xmlns:a16="http://schemas.microsoft.com/office/drawing/2014/main" id="{21317AA6-7E75-483E-A8C6-6B42E89EBC56}"/>
+                  </a:ext>
+                </a:extLst>
+              </p:cNvPr>
+              <p:cNvSpPr>
+                <a:spLocks noGrp="1" noRot="1" noChangeAspect="1" noMove="1" noResize="1" noEditPoints="1" noAdjustHandles="1" noChangeArrowheads="1" noChangeShapeType="1" noTextEdit="1"/>
+              </p:cNvSpPr>
+              <p:nvPr>
+                <p:ph sz="half" idx="1"/>
+              </p:nvPr>
+            </p:nvSpPr>
+            <p:spPr>
+              <a:blipFill>
+                <a:blip r:embed="rId2"/>
+                <a:stretch>
+                  <a:fillRect l="-2118" t="-2241"/>
+                </a:stretch>
+              </a:blipFill>
+            </p:spPr>
+            <p:txBody>
+              <a:bodyPr/>
+              <a:lstStyle/>
+              <a:p>
+                <a:r>
+                  <a:rPr lang="de-DE">
+                    <a:noFill/>
+                  </a:rPr>
+                  <a:t> </a:t>
+                </a:r>
+              </a:p>
+            </p:txBody>
+          </p:sp>
+        </mc:Fallback>
+      </mc:AlternateContent>
+      <p:pic>
+        <p:nvPicPr>
+          <p:cNvPr id="7" name="Inhaltsplatzhalter 6">
+            <a:extLst>
+              <a:ext uri="{FF2B5EF4-FFF2-40B4-BE49-F238E27FC236}">
+                <a16:creationId xmlns:a16="http://schemas.microsoft.com/office/drawing/2014/main" id="{DFBB4AD2-6CFD-478C-AA72-4407B9B26771}"/>
+              </a:ext>
+            </a:extLst>
+          </p:cNvPr>
+          <p:cNvPicPr>
+            <a:picLocks noGrp="1" noChangeAspect="1"/>
+          </p:cNvPicPr>
+          <p:nvPr>
+            <p:ph sz="half" idx="2"/>
+          </p:nvPr>
+        </p:nvPicPr>
+        <p:blipFill>
+          <a:blip r:embed="rId3">
+            <a:extLst>
+              <a:ext uri="{28A0092B-C50C-407E-A947-70E740481C1C}">
+                <a14:useLocalDpi xmlns:a14="http://schemas.microsoft.com/office/drawing/2010/main" val="0"/>
+              </a:ext>
+            </a:extLst>
+          </a:blip>
+          <a:stretch>
+            <a:fillRect/>
+          </a:stretch>
+        </p:blipFill>
+        <p:spPr>
+          <a:xfrm>
+            <a:off x="6172200" y="2215635"/>
+            <a:ext cx="5181600" cy="3571317"/>
+          </a:xfrm>
+        </p:spPr>
+      </p:pic>
+    </p:spTree>
+    <p:extLst>
+      <p:ext uri="{BB962C8B-B14F-4D97-AF65-F5344CB8AC3E}">
+        <p14:creationId xmlns:p14="http://schemas.microsoft.com/office/powerpoint/2010/main" val="3518068574"/>
+      </p:ext>
+    </p:extLst>
+  </p:cSld>
+  <p:clrMapOvr>
+    <a:masterClrMapping/>
+  </p:clrMapOvr>
+</p:sld>
+</file>
+
+<file path=ppt/slides/slide8.xml><?xml version="1.0" encoding="utf-8"?>
+<p:sld xmlns:a="http://schemas.openxmlformats.org/drawingml/2006/main" xmlns:r="http://schemas.openxmlformats.org/officeDocument/2006/relationships" xmlns:p="http://schemas.openxmlformats.org/presentationml/2006/main">
+  <p:cSld>
+    <p:spTree>
+      <p:nvGrpSpPr>
+        <p:cNvPr id="1" name=""/>
+        <p:cNvGrpSpPr/>
+        <p:nvPr/>
+      </p:nvGrpSpPr>
+      <p:grpSpPr>
+        <a:xfrm>
+          <a:off x="0" y="0"/>
+          <a:ext cx="0" cy="0"/>
+          <a:chOff x="0" y="0"/>
+          <a:chExt cx="0" cy="0"/>
+        </a:xfrm>
+      </p:grpSpPr>
+      <p:sp>
+        <p:nvSpPr>
+          <p:cNvPr id="2" name="Titel 1">
+            <a:extLst>
+              <a:ext uri="{FF2B5EF4-FFF2-40B4-BE49-F238E27FC236}">
+                <a16:creationId xmlns:a16="http://schemas.microsoft.com/office/drawing/2014/main" id="{ABBF87BF-7588-4FB8-B28E-6B7F15DA69A9}"/>
+              </a:ext>
+            </a:extLst>
+          </p:cNvPr>
+          <p:cNvSpPr>
+            <a:spLocks noGrp="1"/>
+          </p:cNvSpPr>
+          <p:nvPr>
+            <p:ph type="title"/>
+          </p:nvPr>
+        </p:nvSpPr>
+        <p:spPr/>
+        <p:txBody>
+          <a:bodyPr/>
+          <a:lstStyle/>
+          <a:p>
+            <a:r>
+              <a:rPr lang="de-DE" dirty="0"/>
+              <a:t>Druckabhängigkeit</a:t>
+            </a:r>
+          </a:p>
+        </p:txBody>
+      </p:sp>
+      <p:sp>
+        <p:nvSpPr>
+          <p:cNvPr id="3" name="Inhaltsplatzhalter 2">
+            <a:extLst>
+              <a:ext uri="{FF2B5EF4-FFF2-40B4-BE49-F238E27FC236}">
+                <a16:creationId xmlns:a16="http://schemas.microsoft.com/office/drawing/2014/main" id="{941DB0CC-1FB6-4CDF-945A-8DFEC43257A6}"/>
+              </a:ext>
+            </a:extLst>
+          </p:cNvPr>
+          <p:cNvSpPr>
+            <a:spLocks noGrp="1"/>
+          </p:cNvSpPr>
+          <p:nvPr>
+            <p:ph idx="1"/>
+          </p:nvPr>
+        </p:nvSpPr>
+        <p:spPr/>
+        <p:txBody>
+          <a:bodyPr/>
+          <a:lstStyle/>
+          <a:p>
+            <a:endParaRPr lang="de-DE"/>
+          </a:p>
+        </p:txBody>
+      </p:sp>
+    </p:spTree>
+    <p:extLst>
+      <p:ext uri="{BB962C8B-B14F-4D97-AF65-F5344CB8AC3E}">
+        <p14:creationId xmlns:p14="http://schemas.microsoft.com/office/powerpoint/2010/main" val="3870067177"/>
+      </p:ext>
+    </p:extLst>
+  </p:cSld>
+  <p:clrMapOvr>
+    <a:masterClrMapping/>
+  </p:clrMapOvr>
+</p:sld>
+</file>
+
+<file path=ppt/slides/slide9.xml><?xml version="1.0" encoding="utf-8"?>
+<p:sld xmlns:a="http://schemas.openxmlformats.org/drawingml/2006/main" xmlns:r="http://schemas.openxmlformats.org/officeDocument/2006/relationships" xmlns:p="http://schemas.openxmlformats.org/presentationml/2006/main">
+  <p:cSld>
+    <p:spTree>
+      <p:nvGrpSpPr>
+        <p:cNvPr id="1" name=""/>
+        <p:cNvGrpSpPr/>
+        <p:nvPr/>
+      </p:nvGrpSpPr>
+      <p:grpSpPr>
+        <a:xfrm>
+          <a:off x="0" y="0"/>
+          <a:ext cx="0" cy="0"/>
+          <a:chOff x="0" y="0"/>
+          <a:chExt cx="0" cy="0"/>
+        </a:xfrm>
+      </p:grpSpPr>
+      <p:sp>
+        <p:nvSpPr>
+          <p:cNvPr id="2" name="Titel 1">
+            <a:extLst>
+              <a:ext uri="{FF2B5EF4-FFF2-40B4-BE49-F238E27FC236}">
                 <a16:creationId xmlns:a16="http://schemas.microsoft.com/office/drawing/2014/main" id="{7B750AA0-971B-4267-A51C-B3005B948DFB}"/>
               </a:ext>
             </a:extLst>
@@ -3505,8 +4997,8 @@
           </a:p>
         </p:txBody>
       </p:sp>
-      <mc:AlternateContent xmlns:mc="http://schemas.openxmlformats.org/markup-compatibility/2006">
-        <mc:Choice xmlns:a14="http://schemas.microsoft.com/office/drawing/2010/main" Requires="a14">
+      <mc:AlternateContent xmlns:mc="http://schemas.openxmlformats.org/markup-compatibility/2006" xmlns:a14="http://schemas.microsoft.com/office/drawing/2010/main">
+        <mc:Choice Requires="a14">
           <p:sp>
             <p:nvSpPr>
               <p:cNvPr id="3" name="Inhaltsplatzhalter 2">
@@ -3640,7 +5132,7 @@
                     <m:d>
                       <m:dPr>
                         <m:ctrlPr>
-                          <a:rPr lang="de-DE" b="0" i="0" smtClean="0">
+                          <a:rPr lang="de-DE" b="0" i="1" smtClean="0">
                             <a:latin typeface="Cambria Math" panose="02040503050406030204" pitchFamily="18" charset="0"/>
                           </a:rPr>
                         </m:ctrlPr>
@@ -3809,7 +5301,7 @@
                     <m:d>
                       <m:dPr>
                         <m:ctrlPr>
-                          <a:rPr lang="de-DE" b="0" i="0" smtClean="0">
+                          <a:rPr lang="de-DE" b="0" i="1" smtClean="0">
                             <a:latin typeface="Cambria Math" panose="02040503050406030204" pitchFamily="18" charset="0"/>
                           </a:rPr>
                         </m:ctrlPr>
@@ -3969,7 +5461,7 @@
             </p:txBody>
           </p:sp>
         </mc:Choice>
-        <mc:Fallback>
+        <mc:Fallback xmlns="">
           <p:sp>
             <p:nvSpPr>
               <p:cNvPr id="3" name="Inhaltsplatzhalter 2">
@@ -4013,1258 +5505,6 @@
     <p:extLst>
       <p:ext uri="{BB962C8B-B14F-4D97-AF65-F5344CB8AC3E}">
         <p14:creationId xmlns:p14="http://schemas.microsoft.com/office/powerpoint/2010/main" val="2847838298"/>
-      </p:ext>
-    </p:extLst>
-  </p:cSld>
-  <p:clrMapOvr>
-    <a:masterClrMapping/>
-  </p:clrMapOvr>
-</p:sld>
-</file>
-
-<file path=ppt/slides/slide2.xml><?xml version="1.0" encoding="utf-8"?>
-<p:sld xmlns:a="http://schemas.openxmlformats.org/drawingml/2006/main" xmlns:r="http://schemas.openxmlformats.org/officeDocument/2006/relationships" xmlns:p="http://schemas.openxmlformats.org/presentationml/2006/main">
-  <p:cSld>
-    <p:spTree>
-      <p:nvGrpSpPr>
-        <p:cNvPr id="1" name=""/>
-        <p:cNvGrpSpPr/>
-        <p:nvPr/>
-      </p:nvGrpSpPr>
-      <p:grpSpPr>
-        <a:xfrm>
-          <a:off x="0" y="0"/>
-          <a:ext cx="0" cy="0"/>
-          <a:chOff x="0" y="0"/>
-          <a:chExt cx="0" cy="0"/>
-        </a:xfrm>
-      </p:grpSpPr>
-      <p:sp>
-        <p:nvSpPr>
-          <p:cNvPr id="2" name="Titel 1">
-            <a:extLst>
-              <a:ext uri="{FF2B5EF4-FFF2-40B4-BE49-F238E27FC236}">
-                <a16:creationId xmlns:a16="http://schemas.microsoft.com/office/drawing/2014/main" id="{BDEBBD1B-5604-4C3F-B34C-22D02BB3B57A}"/>
-              </a:ext>
-            </a:extLst>
-          </p:cNvPr>
-          <p:cNvSpPr>
-            <a:spLocks noGrp="1"/>
-          </p:cNvSpPr>
-          <p:nvPr>
-            <p:ph type="title"/>
-          </p:nvPr>
-        </p:nvSpPr>
-        <p:spPr/>
-        <p:txBody>
-          <a:bodyPr/>
-          <a:lstStyle/>
-          <a:p>
-            <a:r>
-              <a:rPr lang="de-DE" dirty="0"/>
-              <a:t>Inhalt</a:t>
-            </a:r>
-          </a:p>
-        </p:txBody>
-      </p:sp>
-      <p:sp>
-        <p:nvSpPr>
-          <p:cNvPr id="3" name="Inhaltsplatzhalter 2">
-            <a:extLst>
-              <a:ext uri="{FF2B5EF4-FFF2-40B4-BE49-F238E27FC236}">
-                <a16:creationId xmlns:a16="http://schemas.microsoft.com/office/drawing/2014/main" id="{A86B45DA-DF66-4B65-AE36-ACC26DE96D41}"/>
-              </a:ext>
-            </a:extLst>
-          </p:cNvPr>
-          <p:cNvSpPr>
-            <a:spLocks noGrp="1"/>
-          </p:cNvSpPr>
-          <p:nvPr>
-            <p:ph idx="1"/>
-          </p:nvPr>
-        </p:nvSpPr>
-        <p:spPr/>
-        <p:txBody>
-          <a:bodyPr/>
-          <a:lstStyle/>
-          <a:p>
-            <a:endParaRPr lang="de-DE"/>
-          </a:p>
-        </p:txBody>
-      </p:sp>
-    </p:spTree>
-    <p:extLst>
-      <p:ext uri="{BB962C8B-B14F-4D97-AF65-F5344CB8AC3E}">
-        <p14:creationId xmlns:p14="http://schemas.microsoft.com/office/powerpoint/2010/main" val="1002867433"/>
-      </p:ext>
-    </p:extLst>
-  </p:cSld>
-  <p:clrMapOvr>
-    <a:masterClrMapping/>
-  </p:clrMapOvr>
-</p:sld>
-</file>
-
-<file path=ppt/slides/slide3.xml><?xml version="1.0" encoding="utf-8"?>
-<p:sld xmlns:a="http://schemas.openxmlformats.org/drawingml/2006/main" xmlns:r="http://schemas.openxmlformats.org/officeDocument/2006/relationships" xmlns:p="http://schemas.openxmlformats.org/presentationml/2006/main">
-  <p:cSld>
-    <p:spTree>
-      <p:nvGrpSpPr>
-        <p:cNvPr id="1" name=""/>
-        <p:cNvGrpSpPr/>
-        <p:nvPr/>
-      </p:nvGrpSpPr>
-      <p:grpSpPr>
-        <a:xfrm>
-          <a:off x="0" y="0"/>
-          <a:ext cx="0" cy="0"/>
-          <a:chOff x="0" y="0"/>
-          <a:chExt cx="0" cy="0"/>
-        </a:xfrm>
-      </p:grpSpPr>
-      <p:sp>
-        <p:nvSpPr>
-          <p:cNvPr id="2" name="Titel 1">
-            <a:extLst>
-              <a:ext uri="{FF2B5EF4-FFF2-40B4-BE49-F238E27FC236}">
-                <a16:creationId xmlns:a16="http://schemas.microsoft.com/office/drawing/2014/main" id="{530447DF-7F46-4D7E-89D2-6E3790C152C9}"/>
-              </a:ext>
-            </a:extLst>
-          </p:cNvPr>
-          <p:cNvSpPr>
-            <a:spLocks noGrp="1"/>
-          </p:cNvSpPr>
-          <p:nvPr>
-            <p:ph type="title"/>
-          </p:nvPr>
-        </p:nvSpPr>
-        <p:spPr/>
-        <p:txBody>
-          <a:bodyPr/>
-          <a:lstStyle/>
-          <a:p>
-            <a:r>
-              <a:rPr lang="de-DE" dirty="0"/>
-              <a:t>Versuchsziele</a:t>
-            </a:r>
-          </a:p>
-        </p:txBody>
-      </p:sp>
-      <p:sp>
-        <p:nvSpPr>
-          <p:cNvPr id="3" name="Inhaltsplatzhalter 2">
-            <a:extLst>
-              <a:ext uri="{FF2B5EF4-FFF2-40B4-BE49-F238E27FC236}">
-                <a16:creationId xmlns:a16="http://schemas.microsoft.com/office/drawing/2014/main" id="{B2D5C7AF-FB30-41DD-8A73-75C4E070D1A1}"/>
-              </a:ext>
-            </a:extLst>
-          </p:cNvPr>
-          <p:cNvSpPr>
-            <a:spLocks noGrp="1"/>
-          </p:cNvSpPr>
-          <p:nvPr>
-            <p:ph idx="1"/>
-          </p:nvPr>
-        </p:nvSpPr>
-        <p:spPr/>
-        <p:txBody>
-          <a:bodyPr/>
-          <a:lstStyle/>
-          <a:p>
-            <a:endParaRPr lang="de-DE"/>
-          </a:p>
-        </p:txBody>
-      </p:sp>
-    </p:spTree>
-    <p:extLst>
-      <p:ext uri="{BB962C8B-B14F-4D97-AF65-F5344CB8AC3E}">
-        <p14:creationId xmlns:p14="http://schemas.microsoft.com/office/powerpoint/2010/main" val="339534271"/>
-      </p:ext>
-    </p:extLst>
-  </p:cSld>
-  <p:clrMapOvr>
-    <a:masterClrMapping/>
-  </p:clrMapOvr>
-</p:sld>
-</file>
-
-<file path=ppt/slides/slide4.xml><?xml version="1.0" encoding="utf-8"?>
-<p:sld xmlns:a="http://schemas.openxmlformats.org/drawingml/2006/main" xmlns:r="http://schemas.openxmlformats.org/officeDocument/2006/relationships" xmlns:p="http://schemas.openxmlformats.org/presentationml/2006/main">
-  <p:cSld>
-    <p:spTree>
-      <p:nvGrpSpPr>
-        <p:cNvPr id="1" name=""/>
-        <p:cNvGrpSpPr/>
-        <p:nvPr/>
-      </p:nvGrpSpPr>
-      <p:grpSpPr>
-        <a:xfrm>
-          <a:off x="0" y="0"/>
-          <a:ext cx="0" cy="0"/>
-          <a:chOff x="0" y="0"/>
-          <a:chExt cx="0" cy="0"/>
-        </a:xfrm>
-      </p:grpSpPr>
-      <p:sp>
-        <p:nvSpPr>
-          <p:cNvPr id="2" name="Titel 1">
-            <a:extLst>
-              <a:ext uri="{FF2B5EF4-FFF2-40B4-BE49-F238E27FC236}">
-                <a16:creationId xmlns:a16="http://schemas.microsoft.com/office/drawing/2014/main" id="{B0961A0C-1807-420A-BE95-3F2D0A77A4C9}"/>
-              </a:ext>
-            </a:extLst>
-          </p:cNvPr>
-          <p:cNvSpPr>
-            <a:spLocks noGrp="1"/>
-          </p:cNvSpPr>
-          <p:nvPr>
-            <p:ph type="title"/>
-          </p:nvPr>
-        </p:nvSpPr>
-        <p:spPr/>
-        <p:txBody>
-          <a:bodyPr/>
-          <a:lstStyle/>
-          <a:p>
-            <a:r>
-              <a:rPr lang="de-DE" dirty="0"/>
-              <a:t>Physikalische Grundlagen</a:t>
-            </a:r>
-          </a:p>
-        </p:txBody>
-      </p:sp>
-      <mc:AlternateContent xmlns:mc="http://schemas.openxmlformats.org/markup-compatibility/2006" xmlns:a14="http://schemas.microsoft.com/office/drawing/2010/main">
-        <mc:Choice Requires="a14">
-          <p:sp>
-            <p:nvSpPr>
-              <p:cNvPr id="3" name="Inhaltsplatzhalter 2">
-                <a:extLst>
-                  <a:ext uri="{FF2B5EF4-FFF2-40B4-BE49-F238E27FC236}">
-                    <a16:creationId xmlns:a16="http://schemas.microsoft.com/office/drawing/2014/main" id="{388E1FC6-8805-48F7-82FA-CD1F9F36C2EF}"/>
-                  </a:ext>
-                </a:extLst>
-              </p:cNvPr>
-              <p:cNvSpPr>
-                <a:spLocks noGrp="1"/>
-              </p:cNvSpPr>
-              <p:nvPr>
-                <p:ph idx="1"/>
-              </p:nvPr>
-            </p:nvSpPr>
-            <p:spPr/>
-            <p:txBody>
-              <a:bodyPr/>
-              <a:lstStyle/>
-              <a:p>
-                <a:endParaRPr lang="de-DE" b="0" i="1" dirty="0">
-                  <a:latin typeface="Cambria Math" panose="02040503050406030204" pitchFamily="18" charset="0"/>
-                </a:endParaRPr>
-              </a:p>
-              <a:p>
-                <a14:m>
-                  <m:oMath xmlns:m="http://schemas.openxmlformats.org/officeDocument/2006/math">
-                    <m:r>
-                      <a:rPr lang="de-DE" b="0" i="1" smtClean="0">
-                        <a:latin typeface="Cambria Math" panose="02040503050406030204" pitchFamily="18" charset="0"/>
-                      </a:rPr>
-                      <m:t>2</m:t>
-                    </m:r>
-                    <m:r>
-                      <a:rPr lang="de-DE" b="0" i="1" smtClean="0">
-                        <a:latin typeface="Cambria Math" panose="02040503050406030204" pitchFamily="18" charset="0"/>
-                      </a:rPr>
-                      <m:t>𝑑</m:t>
-                    </m:r>
-                    <m:func>
-                      <m:funcPr>
-                        <m:ctrlPr>
-                          <a:rPr lang="de-DE" b="0" i="1" smtClean="0">
-                            <a:latin typeface="Cambria Math" panose="02040503050406030204" pitchFamily="18" charset="0"/>
-                          </a:rPr>
-                        </m:ctrlPr>
-                      </m:funcPr>
-                      <m:fName>
-                        <m:r>
-                          <m:rPr>
-                            <m:sty m:val="p"/>
-                          </m:rPr>
-                          <a:rPr lang="de-DE" b="0" i="0" smtClean="0">
-                            <a:latin typeface="Cambria Math" panose="02040503050406030204" pitchFamily="18" charset="0"/>
-                          </a:rPr>
-                          <m:t>cos</m:t>
-                        </m:r>
-                      </m:fName>
-                      <m:e>
-                        <m:r>
-                          <a:rPr lang="de-DE" b="0" i="1" smtClean="0">
-                            <a:latin typeface="Cambria Math" panose="02040503050406030204" pitchFamily="18" charset="0"/>
-                          </a:rPr>
-                          <m:t>𝜃</m:t>
-                        </m:r>
-                      </m:e>
-                    </m:func>
-                    <m:r>
-                      <a:rPr lang="de-DE" b="0" i="1" smtClean="0">
-                        <a:latin typeface="Cambria Math" panose="02040503050406030204" pitchFamily="18" charset="0"/>
-                      </a:rPr>
-                      <m:t>=</m:t>
-                    </m:r>
-                    <m:r>
-                      <a:rPr lang="de-DE" b="0" i="1" smtClean="0">
-                        <a:latin typeface="Cambria Math" panose="02040503050406030204" pitchFamily="18" charset="0"/>
-                      </a:rPr>
-                      <m:t>𝑚</m:t>
-                    </m:r>
-                    <m:r>
-                      <a:rPr lang="de-DE" b="0" i="1" smtClean="0">
-                        <a:latin typeface="Cambria Math" panose="02040503050406030204" pitchFamily="18" charset="0"/>
-                      </a:rPr>
-                      <m:t>𝜆</m:t>
-                    </m:r>
-                    <m:r>
-                      <a:rPr lang="de-DE" b="0" i="0" smtClean="0">
-                        <a:latin typeface="Cambria Math" panose="02040503050406030204" pitchFamily="18" charset="0"/>
-                      </a:rPr>
-                      <m:t> ,  </m:t>
-                    </m:r>
-                    <m:r>
-                      <m:rPr>
-                        <m:sty m:val="p"/>
-                      </m:rPr>
-                      <a:rPr lang="de-DE" b="0" i="0" smtClean="0">
-                        <a:latin typeface="Cambria Math" panose="02040503050406030204" pitchFamily="18" charset="0"/>
-                      </a:rPr>
-                      <m:t>m</m:t>
-                    </m:r>
-                    <m:r>
-                      <a:rPr lang="de-DE" b="0" i="0" smtClean="0">
-                        <a:latin typeface="Cambria Math" panose="02040503050406030204" pitchFamily="18" charset="0"/>
-                      </a:rPr>
-                      <m:t>=0, 1, 2, …</m:t>
-                    </m:r>
-                  </m:oMath>
-                </a14:m>
-                <a:endParaRPr lang="de-DE" dirty="0"/>
-              </a:p>
-              <a:p>
-                <a:endParaRPr lang="de-DE" dirty="0"/>
-              </a:p>
-              <a:p>
-                <a14:m>
-                  <m:oMath xmlns:m="http://schemas.openxmlformats.org/officeDocument/2006/math">
-                    <m:r>
-                      <a:rPr lang="de-DE" b="0" i="1" smtClean="0">
-                        <a:latin typeface="Cambria Math" panose="02040503050406030204" pitchFamily="18" charset="0"/>
-                      </a:rPr>
-                      <m:t>𝑛</m:t>
-                    </m:r>
-                    <m:d>
-                      <m:dPr>
-                        <m:ctrlPr>
-                          <a:rPr lang="de-DE" b="0" i="1" smtClean="0">
-                            <a:latin typeface="Cambria Math" panose="02040503050406030204" pitchFamily="18" charset="0"/>
-                          </a:rPr>
-                        </m:ctrlPr>
-                      </m:dPr>
-                      <m:e>
-                        <m:r>
-                          <a:rPr lang="de-DE" b="0" i="1" smtClean="0">
-                            <a:latin typeface="Cambria Math" panose="02040503050406030204" pitchFamily="18" charset="0"/>
-                          </a:rPr>
-                          <m:t>𝑃</m:t>
-                        </m:r>
-                      </m:e>
-                    </m:d>
-                    <m:r>
-                      <a:rPr lang="de-DE" b="0" i="1" smtClean="0">
-                        <a:latin typeface="Cambria Math" panose="02040503050406030204" pitchFamily="18" charset="0"/>
-                      </a:rPr>
-                      <m:t>=1+ </m:t>
-                    </m:r>
-                    <m:f>
-                      <m:fPr>
-                        <m:ctrlPr>
-                          <a:rPr lang="de-DE" b="0" i="1" smtClean="0">
-                            <a:latin typeface="Cambria Math" panose="02040503050406030204" pitchFamily="18" charset="0"/>
-                          </a:rPr>
-                        </m:ctrlPr>
-                      </m:fPr>
-                      <m:num>
-                        <m:r>
-                          <m:rPr>
-                            <m:sty m:val="p"/>
-                          </m:rPr>
-                          <a:rPr lang="de-DE" b="0" i="0" smtClean="0">
-                            <a:latin typeface="Cambria Math" panose="02040503050406030204" pitchFamily="18" charset="0"/>
-                          </a:rPr>
-                          <m:t>Δ</m:t>
-                        </m:r>
-                        <m:r>
-                          <a:rPr lang="de-DE" b="0" i="1" smtClean="0">
-                            <a:latin typeface="Cambria Math" panose="02040503050406030204" pitchFamily="18" charset="0"/>
-                          </a:rPr>
-                          <m:t>𝑛</m:t>
-                        </m:r>
-                      </m:num>
-                      <m:den>
-                        <m:r>
-                          <m:rPr>
-                            <m:sty m:val="p"/>
-                          </m:rPr>
-                          <a:rPr lang="de-DE" b="0" i="0" smtClean="0">
-                            <a:latin typeface="Cambria Math" panose="02040503050406030204" pitchFamily="18" charset="0"/>
-                          </a:rPr>
-                          <m:t>Δ</m:t>
-                        </m:r>
-                        <m:r>
-                          <a:rPr lang="de-DE" b="0" i="1" smtClean="0">
-                            <a:latin typeface="Cambria Math" panose="02040503050406030204" pitchFamily="18" charset="0"/>
-                          </a:rPr>
-                          <m:t>𝑝</m:t>
-                        </m:r>
-                      </m:den>
-                    </m:f>
-                    <m:r>
-                      <a:rPr lang="de-DE" b="0" i="1" smtClean="0">
-                        <a:latin typeface="Cambria Math" panose="02040503050406030204" pitchFamily="18" charset="0"/>
-                      </a:rPr>
-                      <m:t>𝑃</m:t>
-                    </m:r>
-                  </m:oMath>
-                </a14:m>
-                <a:r>
-                  <a:rPr lang="de-DE" dirty="0"/>
-                  <a:t>			</a:t>
-                </a:r>
-                <a14:m>
-                  <m:oMath xmlns:m="http://schemas.openxmlformats.org/officeDocument/2006/math">
-                    <m:f>
-                      <m:fPr>
-                        <m:ctrlPr>
-                          <a:rPr lang="de-DE" i="1" smtClean="0">
-                            <a:latin typeface="Cambria Math" panose="02040503050406030204" pitchFamily="18" charset="0"/>
-                          </a:rPr>
-                        </m:ctrlPr>
-                      </m:fPr>
-                      <m:num>
-                        <m:r>
-                          <m:rPr>
-                            <m:sty m:val="p"/>
-                          </m:rPr>
-                          <a:rPr lang="de-DE" b="0" i="0" smtClean="0">
-                            <a:latin typeface="Cambria Math" panose="02040503050406030204" pitchFamily="18" charset="0"/>
-                          </a:rPr>
-                          <m:t>Δ</m:t>
-                        </m:r>
-                        <m:r>
-                          <a:rPr lang="de-DE" b="0" i="1" smtClean="0">
-                            <a:latin typeface="Cambria Math" panose="02040503050406030204" pitchFamily="18" charset="0"/>
-                          </a:rPr>
-                          <m:t>𝑛</m:t>
-                        </m:r>
-                      </m:num>
-                      <m:den>
-                        <m:r>
-                          <m:rPr>
-                            <m:sty m:val="p"/>
-                          </m:rPr>
-                          <a:rPr lang="de-DE" b="0" i="0" smtClean="0">
-                            <a:latin typeface="Cambria Math" panose="02040503050406030204" pitchFamily="18" charset="0"/>
-                          </a:rPr>
-                          <m:t>Δ</m:t>
-                        </m:r>
-                        <m:r>
-                          <a:rPr lang="de-DE" b="0" i="1" smtClean="0">
-                            <a:latin typeface="Cambria Math" panose="02040503050406030204" pitchFamily="18" charset="0"/>
-                          </a:rPr>
-                          <m:t>𝑝</m:t>
-                        </m:r>
-                      </m:den>
-                    </m:f>
-                    <m:r>
-                      <a:rPr lang="de-DE" b="0" i="1" smtClean="0">
-                        <a:latin typeface="Cambria Math" panose="02040503050406030204" pitchFamily="18" charset="0"/>
-                      </a:rPr>
-                      <m:t>=</m:t>
-                    </m:r>
-                    <m:f>
-                      <m:fPr>
-                        <m:ctrlPr>
-                          <a:rPr lang="de-DE" b="0" i="1" smtClean="0">
-                            <a:latin typeface="Cambria Math" panose="02040503050406030204" pitchFamily="18" charset="0"/>
-                          </a:rPr>
-                        </m:ctrlPr>
-                      </m:fPr>
-                      <m:num>
-                        <m:r>
-                          <m:rPr>
-                            <m:sty m:val="p"/>
-                          </m:rPr>
-                          <a:rPr lang="de-DE" b="0" i="0" smtClean="0">
-                            <a:latin typeface="Cambria Math" panose="02040503050406030204" pitchFamily="18" charset="0"/>
-                          </a:rPr>
-                          <m:t>Δ</m:t>
-                        </m:r>
-                        <m:r>
-                          <a:rPr lang="de-DE" b="0" i="1" smtClean="0">
-                            <a:latin typeface="Cambria Math" panose="02040503050406030204" pitchFamily="18" charset="0"/>
-                          </a:rPr>
-                          <m:t>𝑚</m:t>
-                        </m:r>
-                      </m:num>
-                      <m:den>
-                        <m:r>
-                          <m:rPr>
-                            <m:sty m:val="p"/>
-                          </m:rPr>
-                          <a:rPr lang="de-DE" b="0" i="0" smtClean="0">
-                            <a:latin typeface="Cambria Math" panose="02040503050406030204" pitchFamily="18" charset="0"/>
-                          </a:rPr>
-                          <m:t>Δ</m:t>
-                        </m:r>
-                        <m:r>
-                          <a:rPr lang="de-DE" b="0" i="1" smtClean="0">
-                            <a:latin typeface="Cambria Math" panose="02040503050406030204" pitchFamily="18" charset="0"/>
-                          </a:rPr>
-                          <m:t>𝑝</m:t>
-                        </m:r>
-                      </m:den>
-                    </m:f>
-                    <m:r>
-                      <a:rPr lang="de-DE" b="0" i="1" smtClean="0">
-                        <a:latin typeface="Cambria Math" panose="02040503050406030204" pitchFamily="18" charset="0"/>
-                      </a:rPr>
-                      <m:t> </m:t>
-                    </m:r>
-                    <m:f>
-                      <m:fPr>
-                        <m:ctrlPr>
-                          <a:rPr lang="de-DE" b="0" i="1" smtClean="0">
-                            <a:latin typeface="Cambria Math" panose="02040503050406030204" pitchFamily="18" charset="0"/>
-                          </a:rPr>
-                        </m:ctrlPr>
-                      </m:fPr>
-                      <m:num>
-                        <m:r>
-                          <a:rPr lang="de-DE" b="0" i="1" smtClean="0">
-                            <a:latin typeface="Cambria Math" panose="02040503050406030204" pitchFamily="18" charset="0"/>
-                          </a:rPr>
-                          <m:t>𝜆</m:t>
-                        </m:r>
-                      </m:num>
-                      <m:den>
-                        <m:r>
-                          <a:rPr lang="de-DE" b="0" i="1" smtClean="0">
-                            <a:latin typeface="Cambria Math" panose="02040503050406030204" pitchFamily="18" charset="0"/>
-                          </a:rPr>
-                          <m:t>2</m:t>
-                        </m:r>
-                        <m:r>
-                          <a:rPr lang="de-DE" b="0" i="1" smtClean="0">
-                            <a:latin typeface="Cambria Math" panose="02040503050406030204" pitchFamily="18" charset="0"/>
-                          </a:rPr>
-                          <m:t>𝐿</m:t>
-                        </m:r>
-                      </m:den>
-                    </m:f>
-                  </m:oMath>
-                </a14:m>
-                <a:endParaRPr lang="de-DE" dirty="0"/>
-              </a:p>
-              <a:p>
-                <a:endParaRPr lang="de-DE" dirty="0"/>
-              </a:p>
-              <a:p>
-                <a14:m>
-                  <m:oMath xmlns:m="http://schemas.openxmlformats.org/officeDocument/2006/math">
-                    <m:sSub>
-                      <m:sSubPr>
-                        <m:ctrlPr>
-                          <a:rPr lang="de-DE" b="0" i="1" smtClean="0">
-                            <a:latin typeface="Cambria Math" panose="02040503050406030204" pitchFamily="18" charset="0"/>
-                          </a:rPr>
-                        </m:ctrlPr>
-                      </m:sSubPr>
-                      <m:e>
-                        <m:r>
-                          <a:rPr lang="de-DE" b="0" i="1" smtClean="0">
-                            <a:latin typeface="Cambria Math" panose="02040503050406030204" pitchFamily="18" charset="0"/>
-                          </a:rPr>
-                          <m:t>𝑛</m:t>
-                        </m:r>
-                      </m:e>
-                      <m:sub>
-                        <m:r>
-                          <a:rPr lang="de-DE" b="0" i="1" smtClean="0">
-                            <a:latin typeface="Cambria Math" panose="02040503050406030204" pitchFamily="18" charset="0"/>
-                          </a:rPr>
-                          <m:t>𝐶</m:t>
-                        </m:r>
-                        <m:sSub>
-                          <m:sSubPr>
-                            <m:ctrlPr>
-                              <a:rPr lang="de-DE" b="0" i="1" smtClean="0">
-                                <a:latin typeface="Cambria Math" panose="02040503050406030204" pitchFamily="18" charset="0"/>
-                              </a:rPr>
-                            </m:ctrlPr>
-                          </m:sSubPr>
-                          <m:e>
-                            <m:r>
-                              <a:rPr lang="de-DE" b="0" i="1" smtClean="0">
-                                <a:latin typeface="Cambria Math" panose="02040503050406030204" pitchFamily="18" charset="0"/>
-                              </a:rPr>
-                              <m:t>𝑂</m:t>
-                            </m:r>
-                          </m:e>
-                          <m:sub>
-                            <m:r>
-                              <a:rPr lang="de-DE" b="0" i="1" smtClean="0">
-                                <a:latin typeface="Cambria Math" panose="02040503050406030204" pitchFamily="18" charset="0"/>
-                              </a:rPr>
-                              <m:t>2</m:t>
-                            </m:r>
-                          </m:sub>
-                        </m:sSub>
-                      </m:sub>
-                    </m:sSub>
-                    <m:r>
-                      <a:rPr lang="de-DE" b="0" i="1" smtClean="0">
-                        <a:latin typeface="Cambria Math" panose="02040503050406030204" pitchFamily="18" charset="0"/>
-                      </a:rPr>
-                      <m:t>=</m:t>
-                    </m:r>
-                    <m:sSub>
-                      <m:sSubPr>
-                        <m:ctrlPr>
-                          <a:rPr lang="de-DE" b="0" i="1" smtClean="0">
-                            <a:latin typeface="Cambria Math" panose="02040503050406030204" pitchFamily="18" charset="0"/>
-                          </a:rPr>
-                        </m:ctrlPr>
-                      </m:sSubPr>
-                      <m:e>
-                        <m:r>
-                          <a:rPr lang="de-DE" b="0" i="1" smtClean="0">
-                            <a:latin typeface="Cambria Math" panose="02040503050406030204" pitchFamily="18" charset="0"/>
-                          </a:rPr>
-                          <m:t>𝑛</m:t>
-                        </m:r>
-                      </m:e>
-                      <m:sub>
-                        <m:r>
-                          <a:rPr lang="de-DE" b="0" i="1" smtClean="0">
-                            <a:latin typeface="Cambria Math" panose="02040503050406030204" pitchFamily="18" charset="0"/>
-                          </a:rPr>
-                          <m:t>𝐿𝑢𝑓𝑡</m:t>
-                        </m:r>
-                      </m:sub>
-                    </m:sSub>
-                    <m:r>
-                      <a:rPr lang="de-DE" b="0" i="1" smtClean="0">
-                        <a:latin typeface="Cambria Math" panose="02040503050406030204" pitchFamily="18" charset="0"/>
-                      </a:rPr>
-                      <m:t>+</m:t>
-                    </m:r>
-                    <m:r>
-                      <m:rPr>
-                        <m:sty m:val="p"/>
-                      </m:rPr>
-                      <a:rPr lang="de-DE" b="0" i="0" smtClean="0">
-                        <a:latin typeface="Cambria Math" panose="02040503050406030204" pitchFamily="18" charset="0"/>
-                      </a:rPr>
-                      <m:t>Δ</m:t>
-                    </m:r>
-                    <m:r>
-                      <a:rPr lang="de-DE" b="0" i="1" smtClean="0">
-                        <a:latin typeface="Cambria Math" panose="02040503050406030204" pitchFamily="18" charset="0"/>
-                      </a:rPr>
-                      <m:t>𝑛</m:t>
-                    </m:r>
-                  </m:oMath>
-                </a14:m>
-                <a:r>
-                  <a:rPr lang="de-DE" dirty="0"/>
-                  <a:t>			</a:t>
-                </a:r>
-                <a14:m>
-                  <m:oMath xmlns:m="http://schemas.openxmlformats.org/officeDocument/2006/math">
-                    <m:r>
-                      <m:rPr>
-                        <m:sty m:val="p"/>
-                      </m:rPr>
-                      <a:rPr lang="de-DE" b="0" i="0" smtClean="0">
-                        <a:latin typeface="Cambria Math" panose="02040503050406030204" pitchFamily="18" charset="0"/>
-                      </a:rPr>
-                      <m:t>Δ</m:t>
-                    </m:r>
-                    <m:r>
-                      <a:rPr lang="de-DE" b="0" i="1" smtClean="0">
-                        <a:latin typeface="Cambria Math" panose="02040503050406030204" pitchFamily="18" charset="0"/>
-                      </a:rPr>
-                      <m:t>𝑛</m:t>
-                    </m:r>
-                    <m:r>
-                      <a:rPr lang="de-DE" b="0" i="1" smtClean="0">
-                        <a:latin typeface="Cambria Math" panose="02040503050406030204" pitchFamily="18" charset="0"/>
-                      </a:rPr>
-                      <m:t>=</m:t>
-                    </m:r>
-                    <m:r>
-                      <m:rPr>
-                        <m:sty m:val="p"/>
-                      </m:rPr>
-                      <a:rPr lang="de-DE" b="0" i="0" smtClean="0">
-                        <a:latin typeface="Cambria Math" panose="02040503050406030204" pitchFamily="18" charset="0"/>
-                      </a:rPr>
-                      <m:t>Δ</m:t>
-                    </m:r>
-                    <m:r>
-                      <a:rPr lang="de-DE" b="0" i="1" smtClean="0">
-                        <a:latin typeface="Cambria Math" panose="02040503050406030204" pitchFamily="18" charset="0"/>
-                      </a:rPr>
-                      <m:t>𝑚</m:t>
-                    </m:r>
-                    <m:r>
-                      <a:rPr lang="de-DE" b="0" i="1" smtClean="0">
-                        <a:latin typeface="Cambria Math" panose="02040503050406030204" pitchFamily="18" charset="0"/>
-                      </a:rPr>
-                      <m:t> </m:t>
-                    </m:r>
-                    <m:f>
-                      <m:fPr>
-                        <m:ctrlPr>
-                          <a:rPr lang="de-DE" b="0" i="1" smtClean="0">
-                            <a:latin typeface="Cambria Math" panose="02040503050406030204" pitchFamily="18" charset="0"/>
-                          </a:rPr>
-                        </m:ctrlPr>
-                      </m:fPr>
-                      <m:num>
-                        <m:r>
-                          <a:rPr lang="de-DE" b="0" i="1" smtClean="0">
-                            <a:latin typeface="Cambria Math" panose="02040503050406030204" pitchFamily="18" charset="0"/>
-                          </a:rPr>
-                          <m:t>𝜆</m:t>
-                        </m:r>
-                      </m:num>
-                      <m:den>
-                        <m:r>
-                          <a:rPr lang="de-DE" b="0" i="1" smtClean="0">
-                            <a:latin typeface="Cambria Math" panose="02040503050406030204" pitchFamily="18" charset="0"/>
-                          </a:rPr>
-                          <m:t>2</m:t>
-                        </m:r>
-                        <m:r>
-                          <a:rPr lang="de-DE" b="0" i="1" smtClean="0">
-                            <a:latin typeface="Cambria Math" panose="02040503050406030204" pitchFamily="18" charset="0"/>
-                          </a:rPr>
-                          <m:t>𝐿</m:t>
-                        </m:r>
-                      </m:den>
-                    </m:f>
-                  </m:oMath>
-                </a14:m>
-                <a:endParaRPr lang="de-DE" dirty="0"/>
-              </a:p>
-            </p:txBody>
-          </p:sp>
-        </mc:Choice>
-        <mc:Fallback xmlns="">
-          <p:sp>
-            <p:nvSpPr>
-              <p:cNvPr id="3" name="Inhaltsplatzhalter 2">
-                <a:extLst>
-                  <a:ext uri="{FF2B5EF4-FFF2-40B4-BE49-F238E27FC236}">
-                    <a16:creationId xmlns:a16="http://schemas.microsoft.com/office/drawing/2014/main" id="{388E1FC6-8805-48F7-82FA-CD1F9F36C2EF}"/>
-                  </a:ext>
-                </a:extLst>
-              </p:cNvPr>
-              <p:cNvSpPr>
-                <a:spLocks noGrp="1" noRot="1" noChangeAspect="1" noMove="1" noResize="1" noEditPoints="1" noAdjustHandles="1" noChangeArrowheads="1" noChangeShapeType="1" noTextEdit="1"/>
-              </p:cNvSpPr>
-              <p:nvPr>
-                <p:ph idx="1"/>
-              </p:nvPr>
-            </p:nvSpPr>
-            <p:spPr>
-              <a:blipFill>
-                <a:blip r:embed="rId2"/>
-                <a:stretch>
-                  <a:fillRect/>
-                </a:stretch>
-              </a:blipFill>
-            </p:spPr>
-            <p:txBody>
-              <a:bodyPr/>
-              <a:lstStyle/>
-              <a:p>
-                <a:r>
-                  <a:rPr lang="de-DE">
-                    <a:noFill/>
-                  </a:rPr>
-                  <a:t> </a:t>
-                </a:r>
-              </a:p>
-            </p:txBody>
-          </p:sp>
-        </mc:Fallback>
-      </mc:AlternateContent>
-    </p:spTree>
-    <p:extLst>
-      <p:ext uri="{BB962C8B-B14F-4D97-AF65-F5344CB8AC3E}">
-        <p14:creationId xmlns:p14="http://schemas.microsoft.com/office/powerpoint/2010/main" val="572028677"/>
-      </p:ext>
-    </p:extLst>
-  </p:cSld>
-  <p:clrMapOvr>
-    <a:masterClrMapping/>
-  </p:clrMapOvr>
-</p:sld>
-</file>
-
-<file path=ppt/slides/slide5.xml><?xml version="1.0" encoding="utf-8"?>
-<p:sld xmlns:a="http://schemas.openxmlformats.org/drawingml/2006/main" xmlns:r="http://schemas.openxmlformats.org/officeDocument/2006/relationships" xmlns:p="http://schemas.openxmlformats.org/presentationml/2006/main">
-  <p:cSld>
-    <p:spTree>
-      <p:nvGrpSpPr>
-        <p:cNvPr id="1" name=""/>
-        <p:cNvGrpSpPr/>
-        <p:nvPr/>
-      </p:nvGrpSpPr>
-      <p:grpSpPr>
-        <a:xfrm>
-          <a:off x="0" y="0"/>
-          <a:ext cx="0" cy="0"/>
-          <a:chOff x="0" y="0"/>
-          <a:chExt cx="0" cy="0"/>
-        </a:xfrm>
-      </p:grpSpPr>
-      <p:sp>
-        <p:nvSpPr>
-          <p:cNvPr id="2" name="Titel 1">
-            <a:extLst>
-              <a:ext uri="{FF2B5EF4-FFF2-40B4-BE49-F238E27FC236}">
-                <a16:creationId xmlns:a16="http://schemas.microsoft.com/office/drawing/2014/main" id="{F8AAC1A0-AA0D-4F91-BA12-D360689F2F29}"/>
-              </a:ext>
-            </a:extLst>
-          </p:cNvPr>
-          <p:cNvSpPr>
-            <a:spLocks noGrp="1"/>
-          </p:cNvSpPr>
-          <p:nvPr>
-            <p:ph type="title"/>
-          </p:nvPr>
-        </p:nvSpPr>
-        <p:spPr/>
-        <p:txBody>
-          <a:bodyPr/>
-          <a:lstStyle/>
-          <a:p>
-            <a:r>
-              <a:rPr lang="de-DE" dirty="0"/>
-              <a:t>Aufbau</a:t>
-            </a:r>
-          </a:p>
-        </p:txBody>
-      </p:sp>
-      <p:pic>
-        <p:nvPicPr>
-          <p:cNvPr id="7" name="Inhaltsplatzhalter 6">
-            <a:extLst>
-              <a:ext uri="{FF2B5EF4-FFF2-40B4-BE49-F238E27FC236}">
-                <a16:creationId xmlns:a16="http://schemas.microsoft.com/office/drawing/2014/main" id="{053B5FB9-B407-4DCB-B5A8-3446068287D6}"/>
-              </a:ext>
-            </a:extLst>
-          </p:cNvPr>
-          <p:cNvPicPr>
-            <a:picLocks noGrp="1" noChangeAspect="1"/>
-          </p:cNvPicPr>
-          <p:nvPr>
-            <p:ph sz="half" idx="1"/>
-          </p:nvPr>
-        </p:nvPicPr>
-        <p:blipFill>
-          <a:blip r:embed="rId2">
-            <a:extLst>
-              <a:ext uri="{28A0092B-C50C-407E-A947-70E740481C1C}">
-                <a14:useLocalDpi xmlns:a14="http://schemas.microsoft.com/office/drawing/2010/main" val="0"/>
-              </a:ext>
-            </a:extLst>
-          </a:blip>
-          <a:stretch>
-            <a:fillRect/>
-          </a:stretch>
-        </p:blipFill>
-        <p:spPr>
-          <a:xfrm>
-            <a:off x="2546252" y="597086"/>
-            <a:ext cx="7399899" cy="5713942"/>
-          </a:xfrm>
-        </p:spPr>
-      </p:pic>
-    </p:spTree>
-    <p:extLst>
-      <p:ext uri="{BB962C8B-B14F-4D97-AF65-F5344CB8AC3E}">
-        <p14:creationId xmlns:p14="http://schemas.microsoft.com/office/powerpoint/2010/main" val="794588133"/>
-      </p:ext>
-    </p:extLst>
-  </p:cSld>
-  <p:clrMapOvr>
-    <a:masterClrMapping/>
-  </p:clrMapOvr>
-</p:sld>
-</file>
-
-<file path=ppt/slides/slide6.xml><?xml version="1.0" encoding="utf-8"?>
-<p:sld xmlns:a="http://schemas.openxmlformats.org/drawingml/2006/main" xmlns:r="http://schemas.openxmlformats.org/officeDocument/2006/relationships" xmlns:p="http://schemas.openxmlformats.org/presentationml/2006/main">
-  <p:cSld>
-    <p:spTree>
-      <p:nvGrpSpPr>
-        <p:cNvPr id="1" name=""/>
-        <p:cNvGrpSpPr/>
-        <p:nvPr/>
-      </p:nvGrpSpPr>
-      <p:grpSpPr>
-        <a:xfrm>
-          <a:off x="0" y="0"/>
-          <a:ext cx="0" cy="0"/>
-          <a:chOff x="0" y="0"/>
-          <a:chExt cx="0" cy="0"/>
-        </a:xfrm>
-      </p:grpSpPr>
-      <p:sp>
-        <p:nvSpPr>
-          <p:cNvPr id="2" name="Titel 1">
-            <a:extLst>
-              <a:ext uri="{FF2B5EF4-FFF2-40B4-BE49-F238E27FC236}">
-                <a16:creationId xmlns:a16="http://schemas.microsoft.com/office/drawing/2014/main" id="{B8302A52-7496-49B5-9198-8A54FE8E7E20}"/>
-              </a:ext>
-            </a:extLst>
-          </p:cNvPr>
-          <p:cNvSpPr>
-            <a:spLocks noGrp="1"/>
-          </p:cNvSpPr>
-          <p:nvPr>
-            <p:ph type="title"/>
-          </p:nvPr>
-        </p:nvSpPr>
-        <p:spPr/>
-        <p:txBody>
-          <a:bodyPr/>
-          <a:lstStyle/>
-          <a:p>
-            <a:r>
-              <a:rPr lang="de-DE" dirty="0"/>
-              <a:t>Durchführung</a:t>
-            </a:r>
-          </a:p>
-        </p:txBody>
-      </p:sp>
-      <p:sp>
-        <p:nvSpPr>
-          <p:cNvPr id="5" name="Inhaltsplatzhalter 4">
-            <a:extLst>
-              <a:ext uri="{FF2B5EF4-FFF2-40B4-BE49-F238E27FC236}">
-                <a16:creationId xmlns:a16="http://schemas.microsoft.com/office/drawing/2014/main" id="{5151B877-495F-427D-8A95-CAA7B4A3DAA9}"/>
-              </a:ext>
-            </a:extLst>
-          </p:cNvPr>
-          <p:cNvSpPr>
-            <a:spLocks noGrp="1"/>
-          </p:cNvSpPr>
-          <p:nvPr>
-            <p:ph idx="1"/>
-          </p:nvPr>
-        </p:nvSpPr>
-        <p:spPr/>
-        <p:txBody>
-          <a:bodyPr/>
-          <a:lstStyle/>
-          <a:p>
-            <a:r>
-              <a:rPr lang="de-DE" dirty="0"/>
-              <a:t>Wellenlänge</a:t>
-            </a:r>
-          </a:p>
-          <a:p>
-            <a:pPr lvl="1"/>
-            <a:r>
-              <a:rPr lang="de-DE" dirty="0"/>
-              <a:t>Variation der optischen Weglänge durch Verschiebung des Spiegel</a:t>
-            </a:r>
-          </a:p>
-          <a:p>
-            <a:r>
-              <a:rPr lang="de-DE" dirty="0"/>
-              <a:t>Druckabhängigkeit</a:t>
-            </a:r>
-          </a:p>
-          <a:p>
-            <a:pPr lvl="1"/>
-            <a:r>
-              <a:rPr lang="de-DE" dirty="0"/>
-              <a:t>Veränderung der optischen Weglänge durch Verringern des Drucks</a:t>
-            </a:r>
-          </a:p>
-          <a:p>
-            <a:r>
-              <a:rPr lang="de-DE" dirty="0"/>
-              <a:t>??</a:t>
-            </a:r>
-          </a:p>
-        </p:txBody>
-      </p:sp>
-    </p:spTree>
-    <p:extLst>
-      <p:ext uri="{BB962C8B-B14F-4D97-AF65-F5344CB8AC3E}">
-        <p14:creationId xmlns:p14="http://schemas.microsoft.com/office/powerpoint/2010/main" val="3733527655"/>
-      </p:ext>
-    </p:extLst>
-  </p:cSld>
-  <p:clrMapOvr>
-    <a:masterClrMapping/>
-  </p:clrMapOvr>
-</p:sld>
-</file>
-
-<file path=ppt/slides/slide7.xml><?xml version="1.0" encoding="utf-8"?>
-<p:sld xmlns:a="http://schemas.openxmlformats.org/drawingml/2006/main" xmlns:r="http://schemas.openxmlformats.org/officeDocument/2006/relationships" xmlns:p="http://schemas.openxmlformats.org/presentationml/2006/main">
-  <p:cSld>
-    <p:spTree>
-      <p:nvGrpSpPr>
-        <p:cNvPr id="1" name=""/>
-        <p:cNvGrpSpPr/>
-        <p:nvPr/>
-      </p:nvGrpSpPr>
-      <p:grpSpPr>
-        <a:xfrm>
-          <a:off x="0" y="0"/>
-          <a:ext cx="0" cy="0"/>
-          <a:chOff x="0" y="0"/>
-          <a:chExt cx="0" cy="0"/>
-        </a:xfrm>
-      </p:grpSpPr>
-      <p:sp>
-        <p:nvSpPr>
-          <p:cNvPr id="2" name="Titel 1">
-            <a:extLst>
-              <a:ext uri="{FF2B5EF4-FFF2-40B4-BE49-F238E27FC236}">
-                <a16:creationId xmlns:a16="http://schemas.microsoft.com/office/drawing/2014/main" id="{82B91491-7839-47EE-BA59-291DA3587ADB}"/>
-              </a:ext>
-            </a:extLst>
-          </p:cNvPr>
-          <p:cNvSpPr>
-            <a:spLocks noGrp="1"/>
-          </p:cNvSpPr>
-          <p:nvPr>
-            <p:ph type="title"/>
-          </p:nvPr>
-        </p:nvSpPr>
-        <p:spPr/>
-        <p:txBody>
-          <a:bodyPr/>
-          <a:lstStyle/>
-          <a:p>
-            <a:r>
-              <a:rPr lang="de-DE" dirty="0"/>
-              <a:t>Kalibration</a:t>
-            </a:r>
-          </a:p>
-        </p:txBody>
-      </p:sp>
-      <p:sp>
-        <p:nvSpPr>
-          <p:cNvPr id="3" name="Inhaltsplatzhalter 2">
-            <a:extLst>
-              <a:ext uri="{FF2B5EF4-FFF2-40B4-BE49-F238E27FC236}">
-                <a16:creationId xmlns:a16="http://schemas.microsoft.com/office/drawing/2014/main" id="{9360FEA0-AE2B-4F70-AF46-9172C68C56A3}"/>
-              </a:ext>
-            </a:extLst>
-          </p:cNvPr>
-          <p:cNvSpPr>
-            <a:spLocks noGrp="1"/>
-          </p:cNvSpPr>
-          <p:nvPr>
-            <p:ph idx="1"/>
-          </p:nvPr>
-        </p:nvSpPr>
-        <p:spPr/>
-        <p:txBody>
-          <a:bodyPr/>
-          <a:lstStyle/>
-          <a:p>
-            <a:endParaRPr lang="de-DE"/>
-          </a:p>
-        </p:txBody>
-      </p:sp>
-    </p:spTree>
-    <p:extLst>
-      <p:ext uri="{BB962C8B-B14F-4D97-AF65-F5344CB8AC3E}">
-        <p14:creationId xmlns:p14="http://schemas.microsoft.com/office/powerpoint/2010/main" val="957132963"/>
-      </p:ext>
-    </p:extLst>
-  </p:cSld>
-  <p:clrMapOvr>
-    <a:masterClrMapping/>
-  </p:clrMapOvr>
-</p:sld>
-</file>
-
-<file path=ppt/slides/slide8.xml><?xml version="1.0" encoding="utf-8"?>
-<p:sld xmlns:a="http://schemas.openxmlformats.org/drawingml/2006/main" xmlns:r="http://schemas.openxmlformats.org/officeDocument/2006/relationships" xmlns:p="http://schemas.openxmlformats.org/presentationml/2006/main">
-  <p:cSld>
-    <p:spTree>
-      <p:nvGrpSpPr>
-        <p:cNvPr id="1" name=""/>
-        <p:cNvGrpSpPr/>
-        <p:nvPr/>
-      </p:nvGrpSpPr>
-      <p:grpSpPr>
-        <a:xfrm>
-          <a:off x="0" y="0"/>
-          <a:ext cx="0" cy="0"/>
-          <a:chOff x="0" y="0"/>
-          <a:chExt cx="0" cy="0"/>
-        </a:xfrm>
-      </p:grpSpPr>
-      <p:sp>
-        <p:nvSpPr>
-          <p:cNvPr id="2" name="Titel 1">
-            <a:extLst>
-              <a:ext uri="{FF2B5EF4-FFF2-40B4-BE49-F238E27FC236}">
-                <a16:creationId xmlns:a16="http://schemas.microsoft.com/office/drawing/2014/main" id="{1DBBC000-D048-464C-9625-9FDE30AE4F5B}"/>
-              </a:ext>
-            </a:extLst>
-          </p:cNvPr>
-          <p:cNvSpPr>
-            <a:spLocks noGrp="1"/>
-          </p:cNvSpPr>
-          <p:nvPr>
-            <p:ph type="title"/>
-          </p:nvPr>
-        </p:nvSpPr>
-        <p:spPr/>
-        <p:txBody>
-          <a:bodyPr/>
-          <a:lstStyle/>
-          <a:p>
-            <a:r>
-              <a:rPr lang="de-DE" dirty="0"/>
-              <a:t>Wellenlänge</a:t>
-            </a:r>
-          </a:p>
-        </p:txBody>
-      </p:sp>
-      <p:sp>
-        <p:nvSpPr>
-          <p:cNvPr id="3" name="Inhaltsplatzhalter 2">
-            <a:extLst>
-              <a:ext uri="{FF2B5EF4-FFF2-40B4-BE49-F238E27FC236}">
-                <a16:creationId xmlns:a16="http://schemas.microsoft.com/office/drawing/2014/main" id="{ED359C53-30DE-4204-A259-D5F9034BE2A7}"/>
-              </a:ext>
-            </a:extLst>
-          </p:cNvPr>
-          <p:cNvSpPr>
-            <a:spLocks noGrp="1"/>
-          </p:cNvSpPr>
-          <p:nvPr>
-            <p:ph idx="1"/>
-          </p:nvPr>
-        </p:nvSpPr>
-        <p:spPr/>
-        <p:txBody>
-          <a:bodyPr/>
-          <a:lstStyle/>
-          <a:p>
-            <a:endParaRPr lang="de-DE"/>
-          </a:p>
-        </p:txBody>
-      </p:sp>
-    </p:spTree>
-    <p:extLst>
-      <p:ext uri="{BB962C8B-B14F-4D97-AF65-F5344CB8AC3E}">
-        <p14:creationId xmlns:p14="http://schemas.microsoft.com/office/powerpoint/2010/main" val="3518068574"/>
-      </p:ext>
-    </p:extLst>
-  </p:cSld>
-  <p:clrMapOvr>
-    <a:masterClrMapping/>
-  </p:clrMapOvr>
-</p:sld>
-</file>
-
-<file path=ppt/slides/slide9.xml><?xml version="1.0" encoding="utf-8"?>
-<p:sld xmlns:a="http://schemas.openxmlformats.org/drawingml/2006/main" xmlns:r="http://schemas.openxmlformats.org/officeDocument/2006/relationships" xmlns:p="http://schemas.openxmlformats.org/presentationml/2006/main">
-  <p:cSld>
-    <p:spTree>
-      <p:nvGrpSpPr>
-        <p:cNvPr id="1" name=""/>
-        <p:cNvGrpSpPr/>
-        <p:nvPr/>
-      </p:nvGrpSpPr>
-      <p:grpSpPr>
-        <a:xfrm>
-          <a:off x="0" y="0"/>
-          <a:ext cx="0" cy="0"/>
-          <a:chOff x="0" y="0"/>
-          <a:chExt cx="0" cy="0"/>
-        </a:xfrm>
-      </p:grpSpPr>
-      <p:sp>
-        <p:nvSpPr>
-          <p:cNvPr id="2" name="Titel 1">
-            <a:extLst>
-              <a:ext uri="{FF2B5EF4-FFF2-40B4-BE49-F238E27FC236}">
-                <a16:creationId xmlns:a16="http://schemas.microsoft.com/office/drawing/2014/main" id="{ABBF87BF-7588-4FB8-B28E-6B7F15DA69A9}"/>
-              </a:ext>
-            </a:extLst>
-          </p:cNvPr>
-          <p:cNvSpPr>
-            <a:spLocks noGrp="1"/>
-          </p:cNvSpPr>
-          <p:nvPr>
-            <p:ph type="title"/>
-          </p:nvPr>
-        </p:nvSpPr>
-        <p:spPr/>
-        <p:txBody>
-          <a:bodyPr/>
-          <a:lstStyle/>
-          <a:p>
-            <a:r>
-              <a:rPr lang="de-DE" dirty="0"/>
-              <a:t>Druckabhängigkeit</a:t>
-            </a:r>
-          </a:p>
-        </p:txBody>
-      </p:sp>
-      <p:sp>
-        <p:nvSpPr>
-          <p:cNvPr id="3" name="Inhaltsplatzhalter 2">
-            <a:extLst>
-              <a:ext uri="{FF2B5EF4-FFF2-40B4-BE49-F238E27FC236}">
-                <a16:creationId xmlns:a16="http://schemas.microsoft.com/office/drawing/2014/main" id="{941DB0CC-1FB6-4CDF-945A-8DFEC43257A6}"/>
-              </a:ext>
-            </a:extLst>
-          </p:cNvPr>
-          <p:cNvSpPr>
-            <a:spLocks noGrp="1"/>
-          </p:cNvSpPr>
-          <p:nvPr>
-            <p:ph idx="1"/>
-          </p:nvPr>
-        </p:nvSpPr>
-        <p:spPr/>
-        <p:txBody>
-          <a:bodyPr/>
-          <a:lstStyle/>
-          <a:p>
-            <a:endParaRPr lang="de-DE"/>
-          </a:p>
-        </p:txBody>
-      </p:sp>
-    </p:spTree>
-    <p:extLst>
-      <p:ext uri="{BB962C8B-B14F-4D97-AF65-F5344CB8AC3E}">
-        <p14:creationId xmlns:p14="http://schemas.microsoft.com/office/powerpoint/2010/main" val="3870067177"/>
       </p:ext>
     </p:extLst>
   </p:cSld>

</xml_diff>